<commit_message>
Prezka by Pyjter - moja część done
</commit_message>
<xml_diff>
--- a/Prezentacje/Prez 2 - oceniana.pptx
+++ b/Prezentacje/Prez 2 - oceniana.pptx
@@ -4,15 +4,17 @@
   <p:sldMasterIdLst>
     <p:sldMasterId id="2147483660" r:id="rId1"/>
   </p:sldMasterIdLst>
+  <p:notesMasterIdLst>
+    <p:notesMasterId r:id="rId9"/>
+  </p:notesMasterIdLst>
   <p:sldIdLst>
     <p:sldId id="256" r:id="rId2"/>
     <p:sldId id="257" r:id="rId3"/>
     <p:sldId id="259" r:id="rId4"/>
-    <p:sldId id="261" r:id="rId5"/>
-    <p:sldId id="262" r:id="rId6"/>
-    <p:sldId id="263" r:id="rId7"/>
-    <p:sldId id="265" r:id="rId8"/>
-    <p:sldId id="264" r:id="rId9"/>
+    <p:sldId id="263" r:id="rId5"/>
+    <p:sldId id="266" r:id="rId6"/>
+    <p:sldId id="262" r:id="rId7"/>
+    <p:sldId id="261" r:id="rId8"/>
   </p:sldIdLst>
   <p:sldSz cx="12192000" cy="6858000"/>
   <p:notesSz cx="6858000" cy="9144000"/>
@@ -119,6 +121,440 @@
 </p:presentation>
 </file>
 
+<file path=ppt/notesMasters/notesMaster1.xml><?xml version="1.0" encoding="utf-8"?>
+<p:notesMaster xmlns:a="http://schemas.openxmlformats.org/drawingml/2006/main" xmlns:r="http://schemas.openxmlformats.org/officeDocument/2006/relationships" xmlns:p="http://schemas.openxmlformats.org/presentationml/2006/main">
+  <p:cSld>
+    <p:bg>
+      <p:bgRef idx="1001">
+        <a:schemeClr val="bg1"/>
+      </p:bgRef>
+    </p:bg>
+    <p:spTree>
+      <p:nvGrpSpPr>
+        <p:cNvPr id="1" name=""/>
+        <p:cNvGrpSpPr/>
+        <p:nvPr/>
+      </p:nvGrpSpPr>
+      <p:grpSpPr>
+        <a:xfrm>
+          <a:off x="0" y="0"/>
+          <a:ext cx="0" cy="0"/>
+          <a:chOff x="0" y="0"/>
+          <a:chExt cx="0" cy="0"/>
+        </a:xfrm>
+      </p:grpSpPr>
+      <p:sp>
+        <p:nvSpPr>
+          <p:cNvPr id="2" name="Symbol zastępczy nagłówka 1"/>
+          <p:cNvSpPr>
+            <a:spLocks noGrp="1"/>
+          </p:cNvSpPr>
+          <p:nvPr>
+            <p:ph type="hdr" sz="quarter"/>
+          </p:nvPr>
+        </p:nvSpPr>
+        <p:spPr>
+          <a:xfrm>
+            <a:off x="0" y="0"/>
+            <a:ext cx="2971800" cy="458788"/>
+          </a:xfrm>
+          <a:prstGeom prst="rect">
+            <a:avLst/>
+          </a:prstGeom>
+        </p:spPr>
+        <p:txBody>
+          <a:bodyPr vert="horz" lIns="91440" tIns="45720" rIns="91440" bIns="45720" rtlCol="0"/>
+          <a:lstStyle>
+            <a:lvl1pPr algn="l">
+              <a:defRPr sz="1200"/>
+            </a:lvl1pPr>
+          </a:lstStyle>
+          <a:p>
+            <a:endParaRPr lang="pl-PL"/>
+          </a:p>
+        </p:txBody>
+      </p:sp>
+      <p:sp>
+        <p:nvSpPr>
+          <p:cNvPr id="3" name="Symbol zastępczy daty 2"/>
+          <p:cNvSpPr>
+            <a:spLocks noGrp="1"/>
+          </p:cNvSpPr>
+          <p:nvPr>
+            <p:ph type="dt" idx="1"/>
+          </p:nvPr>
+        </p:nvSpPr>
+        <p:spPr>
+          <a:xfrm>
+            <a:off x="3884613" y="0"/>
+            <a:ext cx="2971800" cy="458788"/>
+          </a:xfrm>
+          <a:prstGeom prst="rect">
+            <a:avLst/>
+          </a:prstGeom>
+        </p:spPr>
+        <p:txBody>
+          <a:bodyPr vert="horz" lIns="91440" tIns="45720" rIns="91440" bIns="45720" rtlCol="0"/>
+          <a:lstStyle>
+            <a:lvl1pPr algn="r">
+              <a:defRPr sz="1200"/>
+            </a:lvl1pPr>
+          </a:lstStyle>
+          <a:p>
+            <a:fld id="{926C557F-30A5-4215-B53D-D4E129459BD9}" type="datetimeFigureOut">
+              <a:rPr lang="pl-PL" smtClean="0"/>
+              <a:t>06.11.2018</a:t>
+            </a:fld>
+            <a:endParaRPr lang="pl-PL"/>
+          </a:p>
+        </p:txBody>
+      </p:sp>
+      <p:sp>
+        <p:nvSpPr>
+          <p:cNvPr id="4" name="Symbol zastępczy obrazu slajdu 3"/>
+          <p:cNvSpPr>
+            <a:spLocks noGrp="1" noRot="1" noChangeAspect="1"/>
+          </p:cNvSpPr>
+          <p:nvPr>
+            <p:ph type="sldImg" idx="2"/>
+          </p:nvPr>
+        </p:nvSpPr>
+        <p:spPr>
+          <a:xfrm>
+            <a:off x="685800" y="1143000"/>
+            <a:ext cx="5486400" cy="3086100"/>
+          </a:xfrm>
+          <a:prstGeom prst="rect">
+            <a:avLst/>
+          </a:prstGeom>
+          <a:noFill/>
+          <a:ln w="12700">
+            <a:solidFill>
+              <a:prstClr val="black"/>
+            </a:solidFill>
+          </a:ln>
+        </p:spPr>
+        <p:txBody>
+          <a:bodyPr vert="horz" lIns="91440" tIns="45720" rIns="91440" bIns="45720" rtlCol="0" anchor="ctr"/>
+          <a:lstStyle/>
+          <a:p>
+            <a:endParaRPr lang="pl-PL"/>
+          </a:p>
+        </p:txBody>
+      </p:sp>
+      <p:sp>
+        <p:nvSpPr>
+          <p:cNvPr id="5" name="Symbol zastępczy notatek 4"/>
+          <p:cNvSpPr>
+            <a:spLocks noGrp="1"/>
+          </p:cNvSpPr>
+          <p:nvPr>
+            <p:ph type="body" sz="quarter" idx="3"/>
+          </p:nvPr>
+        </p:nvSpPr>
+        <p:spPr>
+          <a:xfrm>
+            <a:off x="685800" y="4400550"/>
+            <a:ext cx="5486400" cy="3600450"/>
+          </a:xfrm>
+          <a:prstGeom prst="rect">
+            <a:avLst/>
+          </a:prstGeom>
+        </p:spPr>
+        <p:txBody>
+          <a:bodyPr vert="horz" lIns="91440" tIns="45720" rIns="91440" bIns="45720" rtlCol="0"/>
+          <a:lstStyle/>
+          <a:p>
+            <a:pPr lvl="0"/>
+            <a:r>
+              <a:rPr lang="pl-PL" smtClean="0"/>
+              <a:t>Edytuj style wzorca tekstu</a:t>
+            </a:r>
+          </a:p>
+          <a:p>
+            <a:pPr lvl="1"/>
+            <a:r>
+              <a:rPr lang="pl-PL" smtClean="0"/>
+              <a:t>Drugi poziom</a:t>
+            </a:r>
+          </a:p>
+          <a:p>
+            <a:pPr lvl="2"/>
+            <a:r>
+              <a:rPr lang="pl-PL" smtClean="0"/>
+              <a:t>Trzeci poziom</a:t>
+            </a:r>
+          </a:p>
+          <a:p>
+            <a:pPr lvl="3"/>
+            <a:r>
+              <a:rPr lang="pl-PL" smtClean="0"/>
+              <a:t>Czwarty poziom</a:t>
+            </a:r>
+          </a:p>
+          <a:p>
+            <a:pPr lvl="4"/>
+            <a:r>
+              <a:rPr lang="pl-PL" smtClean="0"/>
+              <a:t>Piąty poziom</a:t>
+            </a:r>
+            <a:endParaRPr lang="pl-PL"/>
+          </a:p>
+        </p:txBody>
+      </p:sp>
+      <p:sp>
+        <p:nvSpPr>
+          <p:cNvPr id="6" name="Symbol zastępczy stopki 5"/>
+          <p:cNvSpPr>
+            <a:spLocks noGrp="1"/>
+          </p:cNvSpPr>
+          <p:nvPr>
+            <p:ph type="ftr" sz="quarter" idx="4"/>
+          </p:nvPr>
+        </p:nvSpPr>
+        <p:spPr>
+          <a:xfrm>
+            <a:off x="0" y="8685213"/>
+            <a:ext cx="2971800" cy="458787"/>
+          </a:xfrm>
+          <a:prstGeom prst="rect">
+            <a:avLst/>
+          </a:prstGeom>
+        </p:spPr>
+        <p:txBody>
+          <a:bodyPr vert="horz" lIns="91440" tIns="45720" rIns="91440" bIns="45720" rtlCol="0" anchor="b"/>
+          <a:lstStyle>
+            <a:lvl1pPr algn="l">
+              <a:defRPr sz="1200"/>
+            </a:lvl1pPr>
+          </a:lstStyle>
+          <a:p>
+            <a:endParaRPr lang="pl-PL"/>
+          </a:p>
+        </p:txBody>
+      </p:sp>
+      <p:sp>
+        <p:nvSpPr>
+          <p:cNvPr id="7" name="Symbol zastępczy numeru slajdu 6"/>
+          <p:cNvSpPr>
+            <a:spLocks noGrp="1"/>
+          </p:cNvSpPr>
+          <p:nvPr>
+            <p:ph type="sldNum" sz="quarter" idx="5"/>
+          </p:nvPr>
+        </p:nvSpPr>
+        <p:spPr>
+          <a:xfrm>
+            <a:off x="3884613" y="8685213"/>
+            <a:ext cx="2971800" cy="458787"/>
+          </a:xfrm>
+          <a:prstGeom prst="rect">
+            <a:avLst/>
+          </a:prstGeom>
+        </p:spPr>
+        <p:txBody>
+          <a:bodyPr vert="horz" lIns="91440" tIns="45720" rIns="91440" bIns="45720" rtlCol="0" anchor="b"/>
+          <a:lstStyle>
+            <a:lvl1pPr algn="r">
+              <a:defRPr sz="1200"/>
+            </a:lvl1pPr>
+          </a:lstStyle>
+          <a:p>
+            <a:fld id="{13CBE2B1-6275-4A4A-A80C-30980AACC1D9}" type="slidenum">
+              <a:rPr lang="pl-PL" smtClean="0"/>
+              <a:t>‹#›</a:t>
+            </a:fld>
+            <a:endParaRPr lang="pl-PL"/>
+          </a:p>
+        </p:txBody>
+      </p:sp>
+    </p:spTree>
+    <p:extLst>
+      <p:ext uri="{BB962C8B-B14F-4D97-AF65-F5344CB8AC3E}">
+        <p14:creationId xmlns:p14="http://schemas.microsoft.com/office/powerpoint/2010/main" val="3800144351"/>
+      </p:ext>
+    </p:extLst>
+  </p:cSld>
+  <p:clrMap bg1="lt1" tx1="dk1" bg2="lt2" tx2="dk2" accent1="accent1" accent2="accent2" accent3="accent3" accent4="accent4" accent5="accent5" accent6="accent6" hlink="hlink" folHlink="folHlink"/>
+  <p:notesStyle>
+    <a:lvl1pPr marL="0" algn="l" defTabSz="914400" rtl="0" eaLnBrk="1" latinLnBrk="0" hangingPunct="1">
+      <a:defRPr sz="1200" kern="1200">
+        <a:solidFill>
+          <a:schemeClr val="tx1"/>
+        </a:solidFill>
+        <a:latin typeface="+mn-lt"/>
+        <a:ea typeface="+mn-ea"/>
+        <a:cs typeface="+mn-cs"/>
+      </a:defRPr>
+    </a:lvl1pPr>
+    <a:lvl2pPr marL="457200" algn="l" defTabSz="914400" rtl="0" eaLnBrk="1" latinLnBrk="0" hangingPunct="1">
+      <a:defRPr sz="1200" kern="1200">
+        <a:solidFill>
+          <a:schemeClr val="tx1"/>
+        </a:solidFill>
+        <a:latin typeface="+mn-lt"/>
+        <a:ea typeface="+mn-ea"/>
+        <a:cs typeface="+mn-cs"/>
+      </a:defRPr>
+    </a:lvl2pPr>
+    <a:lvl3pPr marL="914400" algn="l" defTabSz="914400" rtl="0" eaLnBrk="1" latinLnBrk="0" hangingPunct="1">
+      <a:defRPr sz="1200" kern="1200">
+        <a:solidFill>
+          <a:schemeClr val="tx1"/>
+        </a:solidFill>
+        <a:latin typeface="+mn-lt"/>
+        <a:ea typeface="+mn-ea"/>
+        <a:cs typeface="+mn-cs"/>
+      </a:defRPr>
+    </a:lvl3pPr>
+    <a:lvl4pPr marL="1371600" algn="l" defTabSz="914400" rtl="0" eaLnBrk="1" latinLnBrk="0" hangingPunct="1">
+      <a:defRPr sz="1200" kern="1200">
+        <a:solidFill>
+          <a:schemeClr val="tx1"/>
+        </a:solidFill>
+        <a:latin typeface="+mn-lt"/>
+        <a:ea typeface="+mn-ea"/>
+        <a:cs typeface="+mn-cs"/>
+      </a:defRPr>
+    </a:lvl4pPr>
+    <a:lvl5pPr marL="1828800" algn="l" defTabSz="914400" rtl="0" eaLnBrk="1" latinLnBrk="0" hangingPunct="1">
+      <a:defRPr sz="1200" kern="1200">
+        <a:solidFill>
+          <a:schemeClr val="tx1"/>
+        </a:solidFill>
+        <a:latin typeface="+mn-lt"/>
+        <a:ea typeface="+mn-ea"/>
+        <a:cs typeface="+mn-cs"/>
+      </a:defRPr>
+    </a:lvl5pPr>
+    <a:lvl6pPr marL="2286000" algn="l" defTabSz="914400" rtl="0" eaLnBrk="1" latinLnBrk="0" hangingPunct="1">
+      <a:defRPr sz="1200" kern="1200">
+        <a:solidFill>
+          <a:schemeClr val="tx1"/>
+        </a:solidFill>
+        <a:latin typeface="+mn-lt"/>
+        <a:ea typeface="+mn-ea"/>
+        <a:cs typeface="+mn-cs"/>
+      </a:defRPr>
+    </a:lvl6pPr>
+    <a:lvl7pPr marL="2743200" algn="l" defTabSz="914400" rtl="0" eaLnBrk="1" latinLnBrk="0" hangingPunct="1">
+      <a:defRPr sz="1200" kern="1200">
+        <a:solidFill>
+          <a:schemeClr val="tx1"/>
+        </a:solidFill>
+        <a:latin typeface="+mn-lt"/>
+        <a:ea typeface="+mn-ea"/>
+        <a:cs typeface="+mn-cs"/>
+      </a:defRPr>
+    </a:lvl7pPr>
+    <a:lvl8pPr marL="3200400" algn="l" defTabSz="914400" rtl="0" eaLnBrk="1" latinLnBrk="0" hangingPunct="1">
+      <a:defRPr sz="1200" kern="1200">
+        <a:solidFill>
+          <a:schemeClr val="tx1"/>
+        </a:solidFill>
+        <a:latin typeface="+mn-lt"/>
+        <a:ea typeface="+mn-ea"/>
+        <a:cs typeface="+mn-cs"/>
+      </a:defRPr>
+    </a:lvl8pPr>
+    <a:lvl9pPr marL="3657600" algn="l" defTabSz="914400" rtl="0" eaLnBrk="1" latinLnBrk="0" hangingPunct="1">
+      <a:defRPr sz="1200" kern="1200">
+        <a:solidFill>
+          <a:schemeClr val="tx1"/>
+        </a:solidFill>
+        <a:latin typeface="+mn-lt"/>
+        <a:ea typeface="+mn-ea"/>
+        <a:cs typeface="+mn-cs"/>
+      </a:defRPr>
+    </a:lvl9pPr>
+  </p:notesStyle>
+</p:notesMaster>
+</file>
+
+<file path=ppt/notesSlides/notesSlide1.xml><?xml version="1.0" encoding="utf-8"?>
+<p:notes xmlns:a="http://schemas.openxmlformats.org/drawingml/2006/main" xmlns:r="http://schemas.openxmlformats.org/officeDocument/2006/relationships" xmlns:p="http://schemas.openxmlformats.org/presentationml/2006/main">
+  <p:cSld>
+    <p:spTree>
+      <p:nvGrpSpPr>
+        <p:cNvPr id="1" name=""/>
+        <p:cNvGrpSpPr/>
+        <p:nvPr/>
+      </p:nvGrpSpPr>
+      <p:grpSpPr>
+        <a:xfrm>
+          <a:off x="0" y="0"/>
+          <a:ext cx="0" cy="0"/>
+          <a:chOff x="0" y="0"/>
+          <a:chExt cx="0" cy="0"/>
+        </a:xfrm>
+      </p:grpSpPr>
+      <p:sp>
+        <p:nvSpPr>
+          <p:cNvPr id="2" name="Symbol zastępczy obrazu slajdu 1"/>
+          <p:cNvSpPr>
+            <a:spLocks noGrp="1" noRot="1" noChangeAspect="1"/>
+          </p:cNvSpPr>
+          <p:nvPr>
+            <p:ph type="sldImg"/>
+          </p:nvPr>
+        </p:nvSpPr>
+        <p:spPr/>
+      </p:sp>
+      <p:sp>
+        <p:nvSpPr>
+          <p:cNvPr id="3" name="Symbol zastępczy notatek 2"/>
+          <p:cNvSpPr>
+            <a:spLocks noGrp="1"/>
+          </p:cNvSpPr>
+          <p:nvPr>
+            <p:ph type="body" idx="1"/>
+          </p:nvPr>
+        </p:nvSpPr>
+        <p:spPr/>
+        <p:txBody>
+          <a:bodyPr/>
+          <a:lstStyle/>
+          <a:p>
+            <a:endParaRPr lang="pl-PL" dirty="0"/>
+          </a:p>
+        </p:txBody>
+      </p:sp>
+      <p:sp>
+        <p:nvSpPr>
+          <p:cNvPr id="4" name="Symbol zastępczy numeru slajdu 3"/>
+          <p:cNvSpPr>
+            <a:spLocks noGrp="1"/>
+          </p:cNvSpPr>
+          <p:nvPr>
+            <p:ph type="sldNum" sz="quarter" idx="10"/>
+          </p:nvPr>
+        </p:nvSpPr>
+        <p:spPr/>
+        <p:txBody>
+          <a:bodyPr/>
+          <a:lstStyle/>
+          <a:p>
+            <a:fld id="{13CBE2B1-6275-4A4A-A80C-30980AACC1D9}" type="slidenum">
+              <a:rPr lang="pl-PL" smtClean="0"/>
+              <a:t>7</a:t>
+            </a:fld>
+            <a:endParaRPr lang="pl-PL"/>
+          </a:p>
+        </p:txBody>
+      </p:sp>
+    </p:spTree>
+    <p:extLst>
+      <p:ext uri="{BB962C8B-B14F-4D97-AF65-F5344CB8AC3E}">
+        <p14:creationId xmlns:p14="http://schemas.microsoft.com/office/powerpoint/2010/main" val="577291071"/>
+      </p:ext>
+    </p:extLst>
+  </p:cSld>
+  <p:clrMapOvr>
+    <a:masterClrMapping/>
+  </p:clrMapOvr>
+</p:notes>
+</file>
+
 <file path=ppt/slideLayouts/slideLayout1.xml><?xml version="1.0" encoding="utf-8"?>
 <p:sldLayout xmlns:a="http://schemas.openxmlformats.org/drawingml/2006/main" xmlns:r="http://schemas.openxmlformats.org/officeDocument/2006/relationships" xmlns:p="http://schemas.openxmlformats.org/presentationml/2006/main" type="title" preserve="1">
   <p:cSld name="Slajd tytułowy">
@@ -393,7 +829,7 @@
           <a:p>
             <a:fld id="{64E4A20C-1B45-45EA-981D-556B4E5457AC}" type="datetimeFigureOut">
               <a:rPr lang="pl-PL" smtClean="0"/>
-              <a:t>05.11.2018</a:t>
+              <a:t>06.11.2018</a:t>
             </a:fld>
             <a:endParaRPr lang="pl-PL"/>
           </a:p>
@@ -807,7 +1243,7 @@
           <a:p>
             <a:fld id="{64E4A20C-1B45-45EA-981D-556B4E5457AC}" type="datetimeFigureOut">
               <a:rPr lang="pl-PL" smtClean="0"/>
-              <a:t>05.11.2018</a:t>
+              <a:t>06.11.2018</a:t>
             </a:fld>
             <a:endParaRPr lang="pl-PL"/>
           </a:p>
@@ -1143,7 +1579,7 @@
           <a:p>
             <a:fld id="{64E4A20C-1B45-45EA-981D-556B4E5457AC}" type="datetimeFigureOut">
               <a:rPr lang="pl-PL" smtClean="0"/>
-              <a:t>05.11.2018</a:t>
+              <a:t>06.11.2018</a:t>
             </a:fld>
             <a:endParaRPr lang="pl-PL"/>
           </a:p>
@@ -1548,7 +1984,7 @@
           <a:p>
             <a:fld id="{64E4A20C-1B45-45EA-981D-556B4E5457AC}" type="datetimeFigureOut">
               <a:rPr lang="pl-PL" smtClean="0"/>
-              <a:t>05.11.2018</a:t>
+              <a:t>06.11.2018</a:t>
             </a:fld>
             <a:endParaRPr lang="pl-PL"/>
           </a:p>
@@ -2116,7 +2552,7 @@
           <a:p>
             <a:fld id="{64E4A20C-1B45-45EA-981D-556B4E5457AC}" type="datetimeFigureOut">
               <a:rPr lang="pl-PL" smtClean="0"/>
-              <a:t>05.11.2018</a:t>
+              <a:t>06.11.2018</a:t>
             </a:fld>
             <a:endParaRPr lang="pl-PL"/>
           </a:p>
@@ -2797,7 +3233,7 @@
           <a:p>
             <a:fld id="{64E4A20C-1B45-45EA-981D-556B4E5457AC}" type="datetimeFigureOut">
               <a:rPr lang="pl-PL" smtClean="0"/>
-              <a:t>05.11.2018</a:t>
+              <a:t>06.11.2018</a:t>
             </a:fld>
             <a:endParaRPr lang="pl-PL"/>
           </a:p>
@@ -3710,7 +4146,7 @@
           <a:p>
             <a:fld id="{64E4A20C-1B45-45EA-981D-556B4E5457AC}" type="datetimeFigureOut">
               <a:rPr lang="pl-PL" smtClean="0"/>
-              <a:t>05.11.2018</a:t>
+              <a:t>06.11.2018</a:t>
             </a:fld>
             <a:endParaRPr lang="pl-PL"/>
           </a:p>
@@ -4023,7 +4459,7 @@
           <a:p>
             <a:fld id="{64E4A20C-1B45-45EA-981D-556B4E5457AC}" type="datetimeFigureOut">
               <a:rPr lang="pl-PL" smtClean="0"/>
-              <a:t>05.11.2018</a:t>
+              <a:t>06.11.2018</a:t>
             </a:fld>
             <a:endParaRPr lang="pl-PL"/>
           </a:p>
@@ -4287,7 +4723,7 @@
           <a:p>
             <a:fld id="{64E4A20C-1B45-45EA-981D-556B4E5457AC}" type="datetimeFigureOut">
               <a:rPr lang="pl-PL" smtClean="0"/>
-              <a:t>05.11.2018</a:t>
+              <a:t>06.11.2018</a:t>
             </a:fld>
             <a:endParaRPr lang="pl-PL"/>
           </a:p>
@@ -4610,7 +5046,7 @@
           <a:p>
             <a:fld id="{64E4A20C-1B45-45EA-981D-556B4E5457AC}" type="datetimeFigureOut">
               <a:rPr lang="pl-PL" smtClean="0"/>
-              <a:t>05.11.2018</a:t>
+              <a:t>06.11.2018</a:t>
             </a:fld>
             <a:endParaRPr lang="pl-PL"/>
           </a:p>
@@ -4999,7 +5435,7 @@
           <a:p>
             <a:fld id="{64E4A20C-1B45-45EA-981D-556B4E5457AC}" type="datetimeFigureOut">
               <a:rPr lang="pl-PL" smtClean="0"/>
-              <a:t>05.11.2018</a:t>
+              <a:t>06.11.2018</a:t>
             </a:fld>
             <a:endParaRPr lang="pl-PL"/>
           </a:p>
@@ -5375,7 +5811,7 @@
           <a:p>
             <a:fld id="{64E4A20C-1B45-45EA-981D-556B4E5457AC}" type="datetimeFigureOut">
               <a:rPr lang="pl-PL" smtClean="0"/>
-              <a:t>05.11.2018</a:t>
+              <a:t>06.11.2018</a:t>
             </a:fld>
             <a:endParaRPr lang="pl-PL"/>
           </a:p>
@@ -5881,7 +6317,7 @@
           <a:p>
             <a:fld id="{64E4A20C-1B45-45EA-981D-556B4E5457AC}" type="datetimeFigureOut">
               <a:rPr lang="pl-PL" smtClean="0"/>
-              <a:t>05.11.2018</a:t>
+              <a:t>06.11.2018</a:t>
             </a:fld>
             <a:endParaRPr lang="pl-PL"/>
           </a:p>
@@ -6138,7 +6574,7 @@
           <a:p>
             <a:fld id="{64E4A20C-1B45-45EA-981D-556B4E5457AC}" type="datetimeFigureOut">
               <a:rPr lang="pl-PL" smtClean="0"/>
-              <a:t>05.11.2018</a:t>
+              <a:t>06.11.2018</a:t>
             </a:fld>
             <a:endParaRPr lang="pl-PL"/>
           </a:p>
@@ -6301,7 +6737,7 @@
           <a:p>
             <a:fld id="{64E4A20C-1B45-45EA-981D-556B4E5457AC}" type="datetimeFigureOut">
               <a:rPr lang="pl-PL" smtClean="0"/>
-              <a:t>05.11.2018</a:t>
+              <a:t>06.11.2018</a:t>
             </a:fld>
             <a:endParaRPr lang="pl-PL"/>
           </a:p>
@@ -6691,7 +7127,7 @@
           <a:p>
             <a:fld id="{64E4A20C-1B45-45EA-981D-556B4E5457AC}" type="datetimeFigureOut">
               <a:rPr lang="pl-PL" smtClean="0"/>
-              <a:t>05.11.2018</a:t>
+              <a:t>06.11.2018</a:t>
             </a:fld>
             <a:endParaRPr lang="pl-PL"/>
           </a:p>
@@ -7100,7 +7536,7 @@
           <a:p>
             <a:fld id="{64E4A20C-1B45-45EA-981D-556B4E5457AC}" type="datetimeFigureOut">
               <a:rPr lang="pl-PL" smtClean="0"/>
-              <a:t>05.11.2018</a:t>
+              <a:t>06.11.2018</a:t>
             </a:fld>
             <a:endParaRPr lang="pl-PL"/>
           </a:p>
@@ -7344,7 +7780,7 @@
           <a:p>
             <a:fld id="{64E4A20C-1B45-45EA-981D-556B4E5457AC}" type="datetimeFigureOut">
               <a:rPr lang="pl-PL" smtClean="0"/>
-              <a:t>05.11.2018</a:t>
+              <a:t>06.11.2018</a:t>
             </a:fld>
             <a:endParaRPr lang="pl-PL"/>
           </a:p>
@@ -7834,6 +8270,13 @@
   <p:clrMapOvr>
     <a:masterClrMapping/>
   </p:clrMapOvr>
+  <p:timing>
+    <p:tnLst>
+      <p:par>
+        <p:cTn id="1" dur="indefinite" restart="never" nodeType="tmRoot"/>
+      </p:par>
+    </p:tnLst>
+  </p:timing>
 </p:sld>
 </file>
 
@@ -7943,6 +8386,13 @@
   <p:clrMapOvr>
     <a:masterClrMapping/>
   </p:clrMapOvr>
+  <p:timing>
+    <p:tnLst>
+      <p:par>
+        <p:cTn id="1" dur="indefinite" restart="never" nodeType="tmRoot"/>
+      </p:par>
+    </p:tnLst>
+  </p:timing>
 </p:sld>
 </file>
 
@@ -8047,6 +8497,13 @@
   <p:clrMapOvr>
     <a:masterClrMapping/>
   </p:clrMapOvr>
+  <p:timing>
+    <p:tnLst>
+      <p:par>
+        <p:cTn id="1" dur="indefinite" restart="never" nodeType="tmRoot"/>
+      </p:par>
+    </p:tnLst>
+  </p:timing>
 </p:sld>
 </file>
 
@@ -8084,55 +8541,145 @@
           <a:p>
             <a:r>
               <a:rPr lang="pl-PL" dirty="0" smtClean="0"/>
-              <a:t>Algorytmy szukania ścieżki</a:t>
+              <a:t>Proceduralne generowanie </a:t>
+            </a:r>
+            <a:r>
+              <a:rPr lang="pl-PL" dirty="0" smtClean="0"/>
+              <a:t>terenu – szum Perlina</a:t>
             </a:r>
             <a:endParaRPr lang="pl-PL" dirty="0"/>
           </a:p>
         </p:txBody>
       </p:sp>
-      <p:sp>
-        <p:nvSpPr>
-          <p:cNvPr id="3" name="Symbol zastępczy zawartości 2"/>
-          <p:cNvSpPr>
-            <a:spLocks noGrp="1"/>
-          </p:cNvSpPr>
-          <p:nvPr>
-            <p:ph idx="1"/>
-          </p:nvPr>
-        </p:nvSpPr>
-        <p:spPr>
-          <a:xfrm>
-            <a:off x="680320" y="2029142"/>
-            <a:ext cx="9613861" cy="4371658"/>
-          </a:xfrm>
-        </p:spPr>
-        <p:txBody>
-          <a:bodyPr/>
+      <p:pic>
+        <p:nvPicPr>
+          <p:cNvPr id="6" name="Symbol zastępczy zawartości 5"/>
+          <p:cNvPicPr>
+            <a:picLocks noGrp="1" noChangeAspect="1"/>
+          </p:cNvPicPr>
+          <p:nvPr>
+            <p:ph sz="half" idx="1"/>
+          </p:nvPr>
+        </p:nvPicPr>
+        <p:blipFill>
+          <a:blip r:embed="rId2">
+            <a:extLst>
+              <a:ext uri="{28A0092B-C50C-407E-A947-70E740481C1C}">
+                <a14:useLocalDpi xmlns:a14="http://schemas.microsoft.com/office/drawing/2010/main" val="0"/>
+              </a:ext>
+            </a:extLst>
+          </a:blip>
+          <a:stretch>
+            <a:fillRect/>
+          </a:stretch>
+        </p:blipFill>
+        <p:spPr>
+          <a:xfrm>
+            <a:off x="680321" y="2336873"/>
+            <a:ext cx="3599316" cy="3599316"/>
+          </a:xfrm>
+        </p:spPr>
+      </p:pic>
+      <p:sp>
+        <p:nvSpPr>
+          <p:cNvPr id="5" name="Symbol zastępczy zawartości 4"/>
+          <p:cNvSpPr>
+            <a:spLocks noGrp="1"/>
+          </p:cNvSpPr>
+          <p:nvPr>
+            <p:ph sz="half" idx="2"/>
+          </p:nvPr>
+        </p:nvSpPr>
+        <p:spPr>
+          <a:xfrm>
+            <a:off x="4508500" y="2336872"/>
+            <a:ext cx="5785681" cy="4114727"/>
+          </a:xfrm>
+        </p:spPr>
+        <p:txBody>
+          <a:bodyPr>
+            <a:normAutofit fontScale="92500" lnSpcReduction="10000"/>
+          </a:bodyPr>
           <a:lstStyle/>
           <a:p>
+            <a:pPr marL="0" indent="0">
+              <a:buNone/>
+            </a:pPr>
             <a:r>
               <a:rPr lang="pl-PL" dirty="0"/>
-              <a:t>Algorytm A*</a:t>
-            </a:r>
-          </a:p>
-          <a:p>
+              <a:t>Szum został stworzony w roku 1983 przez Perlina jako rezultat frustracji spowodowanej „maszyno-podobnym” wyglądem ówczesnej </a:t>
+            </a:r>
+            <a:r>
+              <a:rPr lang="pl-PL" dirty="0" smtClean="0"/>
+              <a:t>grafik </a:t>
+            </a:r>
             <a:r>
               <a:rPr lang="pl-PL" dirty="0"/>
-              <a:t>https://pl.wikipedia.org/wiki/Algorytm_A*#Cechy_algorytmu_A*</a:t>
-            </a:r>
+              <a:t>komputerowej oraz w czasie jego prac nad filmem </a:t>
+            </a:r>
+            <a:r>
+              <a:rPr lang="pl-PL" dirty="0" smtClean="0"/>
+              <a:t>Tron. </a:t>
+            </a:r>
+            <a:r>
+              <a:rPr lang="pl-PL" dirty="0"/>
+              <a:t>Wyniki swojej pracy Perlin opublikował w 1985 </a:t>
+            </a:r>
+            <a:r>
+              <a:rPr lang="pl-PL" dirty="0" smtClean="0"/>
+              <a:t>roku. </a:t>
+            </a:r>
+            <a:r>
+              <a:rPr lang="pl-PL" dirty="0"/>
+              <a:t>W 1997 roku autor algorytmu otrzymał za swoją pracę Oscara w kategorii </a:t>
+            </a:r>
+            <a:r>
+              <a:rPr lang="pl-PL" dirty="0" smtClean="0"/>
+              <a:t>technicznej</a:t>
+            </a:r>
+            <a:r>
+              <a:rPr lang="pl-PL" baseline="30000" dirty="0" smtClean="0"/>
+              <a:t>.</a:t>
+            </a:r>
+            <a:endParaRPr lang="pl-PL" dirty="0" smtClean="0"/>
+          </a:p>
+          <a:p>
+            <a:pPr marL="0" indent="0">
+              <a:buNone/>
+            </a:pPr>
+            <a:r>
+              <a:rPr lang="pl-PL" dirty="0" smtClean="0"/>
+              <a:t>Algorytm</a:t>
+            </a:r>
+            <a:r>
+              <a:rPr lang="pl-PL" dirty="0"/>
+              <a:t> generowania szumu </a:t>
+            </a:r>
+            <a:r>
+              <a:rPr lang="pl-PL" dirty="0" smtClean="0"/>
+              <a:t>gradientowego. Tworzenie tego szumu polega na utworzeniu siatki losowych gradientów, które są interpolowane w celu uzyskania wartości pomiędzy kratami. </a:t>
+            </a:r>
+            <a:endParaRPr lang="pl-PL" dirty="0"/>
           </a:p>
         </p:txBody>
       </p:sp>
     </p:spTree>
     <p:extLst>
       <p:ext uri="{BB962C8B-B14F-4D97-AF65-F5344CB8AC3E}">
-        <p14:creationId xmlns:p14="http://schemas.microsoft.com/office/powerpoint/2010/main" val="3667945494"/>
+        <p14:creationId xmlns:p14="http://schemas.microsoft.com/office/powerpoint/2010/main" val="1904851423"/>
       </p:ext>
     </p:extLst>
   </p:cSld>
   <p:clrMapOvr>
     <a:masterClrMapping/>
   </p:clrMapOvr>
+  <p:timing>
+    <p:tnLst>
+      <p:par>
+        <p:cTn id="1" dur="indefinite" restart="never" nodeType="tmRoot"/>
+      </p:par>
+    </p:tnLst>
+  </p:timing>
 </p:sld>
 </file>
 
@@ -8185,28 +8732,97 @@
             <p:ph idx="1"/>
           </p:nvPr>
         </p:nvSpPr>
-        <p:spPr/>
-        <p:txBody>
-          <a:bodyPr/>
+        <p:spPr>
+          <a:xfrm>
+            <a:off x="680321" y="2336872"/>
+            <a:ext cx="9613861" cy="4381427"/>
+          </a:xfrm>
+        </p:spPr>
+        <p:txBody>
+          <a:bodyPr>
+            <a:normAutofit/>
+          </a:bodyPr>
           <a:lstStyle/>
           <a:p>
+            <a:pPr marL="0" indent="0">
+              <a:buNone/>
+            </a:pPr>
+            <a:r>
+              <a:rPr lang="pl-PL" sz="2800" dirty="0"/>
+              <a:t>Do znalezienia najkrótszej ścieżki pomiędzy dwoma wierzchołkami zazwyczaj używane są algorytmy:</a:t>
+            </a:r>
+          </a:p>
+          <a:p>
+            <a:endParaRPr lang="pl-PL" dirty="0"/>
+          </a:p>
+          <a:p>
+            <a:r>
+              <a:rPr lang="pl-PL" dirty="0"/>
+              <a:t>Dijkstry (przy założeniu, że w grafie nie ma wag ujemnych) </a:t>
+            </a:r>
             <a:r>
               <a:rPr lang="pl-PL" dirty="0" smtClean="0"/>
-              <a:t>Algorytm Dijkstry</a:t>
-            </a:r>
-          </a:p>
-          <a:p>
+              <a:t>o pesymistycznej złożoności obliczeniowej O(</a:t>
+            </a:r>
+            <a:r>
+              <a:rPr lang="pl-PL" dirty="0" err="1" smtClean="0"/>
+              <a:t>Vlog</a:t>
+            </a:r>
+            <a:r>
+              <a:rPr lang="pl-PL" dirty="0" smtClean="0"/>
+              <a:t> V+E)</a:t>
+            </a:r>
+          </a:p>
+          <a:p>
+            <a:r>
+              <a:rPr lang="pl-PL" dirty="0" err="1" smtClean="0"/>
+              <a:t>Bellmana-Forda</a:t>
+            </a:r>
+            <a:r>
+              <a:rPr lang="pl-PL" dirty="0" smtClean="0"/>
+              <a:t> o pesymistycznej złożoności </a:t>
+            </a:r>
+            <a:br>
+              <a:rPr lang="pl-PL" dirty="0" smtClean="0"/>
+            </a:br>
+            <a:r>
+              <a:rPr lang="pl-PL" dirty="0" smtClean="0"/>
+              <a:t>obliczeniowej O(VE),</a:t>
+            </a:r>
+          </a:p>
+          <a:p>
+            <a:r>
+              <a:rPr lang="pl-PL" dirty="0" smtClean="0"/>
+              <a:t>A</a:t>
+            </a:r>
             <a:r>
               <a:rPr lang="pl-PL" dirty="0"/>
-              <a:t>https://pl.wikipedia.org/wiki/Algorytm_Dijkstry#Dzia%C5%82anie</a:t>
-            </a:r>
+              <a:t>*, używający heurystyki</a:t>
+            </a:r>
+            <a:r>
+              <a:rPr lang="pl-PL" dirty="0" smtClean="0"/>
+              <a:t>,</a:t>
+            </a:r>
+          </a:p>
+          <a:p>
+            <a:endParaRPr lang="pl-PL" dirty="0"/>
+          </a:p>
+          <a:p>
+            <a:pPr marL="0" indent="0">
+              <a:buNone/>
+            </a:pPr>
+            <a:r>
+              <a:rPr lang="pl-PL" dirty="0"/>
+              <a:t>gdzie V to liczba wierzchołków grafu, a E to liczba jego krawędzi.</a:t>
+            </a:r>
+            <a:endParaRPr lang="pl-PL" dirty="0"/>
           </a:p>
         </p:txBody>
       </p:sp>
     </p:spTree>
     <p:extLst>
       <p:ext uri="{BB962C8B-B14F-4D97-AF65-F5344CB8AC3E}">
-        <p14:creationId xmlns:p14="http://schemas.microsoft.com/office/powerpoint/2010/main" val="1439500000"/>
+        <p14:creationId xmlns:p14="http://schemas.microsoft.com/office/powerpoint/2010/main" val="1083913898"/>
       </p:ext>
     </p:extLst>
   </p:cSld>
@@ -8249,67 +8865,98 @@
           <a:lstStyle/>
           <a:p>
             <a:r>
+              <a:rPr lang="pl-PL" dirty="0"/>
+              <a:t>Algorytmy szukania </a:t>
+            </a:r>
+            <a:r>
               <a:rPr lang="pl-PL" dirty="0" smtClean="0"/>
-              <a:t>Proceduralne generowanie terenu</a:t>
+              <a:t>ścieżki – algorytm Dijkstry</a:t>
             </a:r>
             <a:endParaRPr lang="pl-PL" dirty="0"/>
           </a:p>
         </p:txBody>
       </p:sp>
-      <p:sp>
-        <p:nvSpPr>
-          <p:cNvPr id="3" name="Symbol zastępczy zawartości 2"/>
-          <p:cNvSpPr>
-            <a:spLocks noGrp="1"/>
-          </p:cNvSpPr>
-          <p:nvPr>
-            <p:ph idx="1"/>
-          </p:nvPr>
-        </p:nvSpPr>
-        <p:spPr/>
-        <p:txBody>
-          <a:bodyPr/>
+      <p:pic>
+        <p:nvPicPr>
+          <p:cNvPr id="8" name="Symbol zastępczy zawartości 7"/>
+          <p:cNvPicPr>
+            <a:picLocks noGrp="1" noChangeAspect="1"/>
+          </p:cNvPicPr>
+          <p:nvPr>
+            <p:ph sz="half" idx="1"/>
+          </p:nvPr>
+        </p:nvPicPr>
+        <p:blipFill>
+          <a:blip r:embed="rId2">
+            <a:extLst>
+              <a:ext uri="{28A0092B-C50C-407E-A947-70E740481C1C}">
+                <a14:useLocalDpi xmlns:a14="http://schemas.microsoft.com/office/drawing/2010/main" val="0"/>
+              </a:ext>
+            </a:extLst>
+          </a:blip>
+          <a:stretch>
+            <a:fillRect/>
+          </a:stretch>
+        </p:blipFill>
+        <p:spPr>
+          <a:xfrm>
+            <a:off x="680321" y="2336872"/>
+            <a:ext cx="4588317" cy="4229027"/>
+          </a:xfrm>
+        </p:spPr>
+      </p:pic>
+      <p:sp>
+        <p:nvSpPr>
+          <p:cNvPr id="7" name="Symbol zastępczy zawartości 6"/>
+          <p:cNvSpPr>
+            <a:spLocks noGrp="1"/>
+          </p:cNvSpPr>
+          <p:nvPr>
+            <p:ph sz="half" idx="2"/>
+          </p:nvPr>
+        </p:nvSpPr>
+        <p:spPr>
+          <a:xfrm>
+            <a:off x="5594123" y="2336872"/>
+            <a:ext cx="4700058" cy="4368728"/>
+          </a:xfrm>
+        </p:spPr>
+        <p:txBody>
+          <a:bodyPr>
+            <a:normAutofit fontScale="77500" lnSpcReduction="20000"/>
+          </a:bodyPr>
           <a:lstStyle/>
           <a:p>
             <a:r>
-              <a:rPr lang="pl-PL" dirty="0">
-                <a:hlinkClick r:id="rId2"/>
-              </a:rPr>
-              <a:t>https://</a:t>
-            </a:r>
-            <a:r>
-              <a:rPr lang="pl-PL" dirty="0" smtClean="0">
-                <a:hlinkClick r:id="rId2"/>
-              </a:rPr>
-              <a:t>pl.wikipedia.org/wiki/Szum_Perlina</a:t>
+              <a:rPr lang="pl-PL" dirty="0"/>
+              <a:t>Mając dany graf z wyróżnionym wierzchołkiem (źródłem) algorytm znajduje odległości od źródła do wszystkich pozostałych wierzchołków. Łatwo zmodyfikować go tak, aby szukał wyłącznie (najkrótszej) ścieżki do jednego ustalonego wierzchołka, po prostu przerywając działanie w momencie dojścia do wierzchołka docelowego, bądź transponując tablicę incydencji grafu</a:t>
             </a:r>
             <a:r>
               <a:rPr lang="pl-PL" dirty="0" smtClean="0"/>
-              <a:t> </a:t>
-            </a:r>
-          </a:p>
-          <a:p>
-            <a:r>
-              <a:rPr lang="pl-PL">
-                <a:hlinkClick r:id="rId3"/>
-              </a:rPr>
-              <a:t>https</a:t>
-            </a:r>
-            <a:r>
-              <a:rPr lang="pl-PL">
-                <a:hlinkClick r:id="rId3"/>
-              </a:rPr>
-              <a:t>://</a:t>
-            </a:r>
-            <a:r>
-              <a:rPr lang="pl-PL" smtClean="0">
-                <a:hlinkClick r:id="rId3"/>
-              </a:rPr>
-              <a:t>en.wikipedia.org/wiki/Perlin_noise</a:t>
-            </a:r>
-            <a:endParaRPr lang="pl-PL" smtClean="0"/>
-          </a:p>
-          <a:p>
+              <a:t>.</a:t>
+            </a:r>
+            <a:endParaRPr lang="pl-PL" dirty="0"/>
+          </a:p>
+          <a:p>
+            <a:r>
+              <a:rPr lang="pl-PL" dirty="0"/>
+              <a:t>Algorytm Dijkstry znajduje w grafie wszystkie najkrótsze ścieżki pomiędzy wybranym wierzchołkiem a wszystkimi pozostałymi, przy okazji wyliczając również koszt przejścia każdej z tych </a:t>
+            </a:r>
+            <a:r>
+              <a:rPr lang="pl-PL" dirty="0" smtClean="0"/>
+              <a:t>ścieżek.</a:t>
+            </a:r>
+            <a:endParaRPr lang="pl-PL" dirty="0"/>
+          </a:p>
+          <a:p>
+            <a:r>
+              <a:rPr lang="pl-PL" dirty="0"/>
+              <a:t>Algorytm Dijkstry jest przykładem algorytmu </a:t>
+            </a:r>
+            <a:r>
+              <a:rPr lang="pl-PL" dirty="0" smtClean="0"/>
+              <a:t>zachłannego.</a:t>
+            </a:r>
             <a:endParaRPr lang="pl-PL" dirty="0"/>
           </a:p>
         </p:txBody>
@@ -8317,13 +8964,20 @@
     </p:spTree>
     <p:extLst>
       <p:ext uri="{BB962C8B-B14F-4D97-AF65-F5344CB8AC3E}">
-        <p14:creationId xmlns:p14="http://schemas.microsoft.com/office/powerpoint/2010/main" val="1904851423"/>
+        <p14:creationId xmlns:p14="http://schemas.microsoft.com/office/powerpoint/2010/main" val="1439500000"/>
       </p:ext>
     </p:extLst>
   </p:cSld>
   <p:clrMapOvr>
     <a:masterClrMapping/>
   </p:clrMapOvr>
+  <p:timing>
+    <p:tnLst>
+      <p:par>
+        <p:cTn id="1" dur="indefinite" restart="never" nodeType="tmRoot"/>
+      </p:par>
+    </p:tnLst>
+  </p:timing>
 </p:sld>
 </file>
 
@@ -8361,123 +9015,129 @@
           <a:p>
             <a:r>
               <a:rPr lang="pl-PL" dirty="0" smtClean="0"/>
-              <a:t>Generowanie labiryntów</a:t>
+              <a:t>Algorytmy szukania </a:t>
+            </a:r>
+            <a:r>
+              <a:rPr lang="pl-PL" dirty="0" smtClean="0"/>
+              <a:t>ścieżki – A*</a:t>
             </a:r>
             <a:endParaRPr lang="pl-PL" dirty="0"/>
           </a:p>
         </p:txBody>
       </p:sp>
-      <p:sp>
-        <p:nvSpPr>
-          <p:cNvPr id="3" name="Symbol zastępczy zawartości 2"/>
-          <p:cNvSpPr>
-            <a:spLocks noGrp="1"/>
-          </p:cNvSpPr>
-          <p:nvPr>
-            <p:ph idx="1"/>
-          </p:nvPr>
-        </p:nvSpPr>
-        <p:spPr/>
-        <p:txBody>
-          <a:bodyPr/>
+      <p:pic>
+        <p:nvPicPr>
+          <p:cNvPr id="6" name="Symbol zastępczy zawartości 5"/>
+          <p:cNvPicPr>
+            <a:picLocks noGrp="1" noChangeAspect="1"/>
+          </p:cNvPicPr>
+          <p:nvPr>
+            <p:ph sz="half" idx="1"/>
+          </p:nvPr>
+        </p:nvPicPr>
+        <p:blipFill>
+          <a:blip r:embed="rId3">
+            <a:extLst>
+              <a:ext uri="{28A0092B-C50C-407E-A947-70E740481C1C}">
+                <a14:useLocalDpi xmlns:a14="http://schemas.microsoft.com/office/drawing/2010/main" val="0"/>
+              </a:ext>
+            </a:extLst>
+          </a:blip>
+          <a:stretch>
+            <a:fillRect/>
+          </a:stretch>
+        </p:blipFill>
+        <p:spPr>
+          <a:xfrm>
+            <a:off x="225224" y="2336873"/>
+            <a:ext cx="5087371" cy="3599315"/>
+          </a:xfrm>
+        </p:spPr>
+      </p:pic>
+      <p:sp>
+        <p:nvSpPr>
+          <p:cNvPr id="5" name="Symbol zastępczy zawartości 4"/>
+          <p:cNvSpPr>
+            <a:spLocks noGrp="1"/>
+          </p:cNvSpPr>
+          <p:nvPr>
+            <p:ph sz="half" idx="2"/>
+          </p:nvPr>
+        </p:nvSpPr>
+        <p:spPr>
+          <a:xfrm>
+            <a:off x="5594123" y="2336873"/>
+            <a:ext cx="6388080" cy="3599316"/>
+          </a:xfrm>
+        </p:spPr>
+        <p:txBody>
+          <a:bodyPr>
+            <a:normAutofit lnSpcReduction="10000"/>
+          </a:bodyPr>
           <a:lstStyle/>
           <a:p>
+            <a:pPr marL="0" indent="0">
+              <a:buNone/>
+            </a:pPr>
+            <a:r>
+              <a:rPr lang="pl-PL" dirty="0" smtClean="0"/>
+              <a:t>Dzięki wykorzystaniu heurystyki, algorytm ten jest najszybszy w działaniu.</a:t>
+            </a:r>
             <a:r>
               <a:rPr lang="pl-PL" dirty="0"/>
-              <a:t>https://en.wikipedia.org/wiki/Diamond-square_algorithm</a:t>
-            </a:r>
+              <a:t> Metody używa się też często do znajdowania rozwiązań przybliżonych, na podstawie których później wylicza się ostateczny rezultat pełnym </a:t>
+            </a:r>
+            <a:r>
+              <a:rPr lang="pl-PL" dirty="0" smtClean="0"/>
+              <a:t>algorytmem</a:t>
+            </a:r>
+            <a:r>
+              <a:rPr lang="pl-PL" dirty="0"/>
+              <a:t>.</a:t>
+            </a:r>
+            <a:r>
+              <a:rPr lang="pl-PL" dirty="0" smtClean="0"/>
+              <a:t/>
+            </a:r>
+            <a:br>
+              <a:rPr lang="pl-PL" dirty="0" smtClean="0"/>
+            </a:br>
+            <a:r>
+              <a:rPr lang="pl-PL" dirty="0" smtClean="0"/>
+              <a:t/>
+            </a:r>
+            <a:br>
+              <a:rPr lang="pl-PL" dirty="0" smtClean="0"/>
+            </a:br>
+            <a:r>
+              <a:rPr lang="pl-PL" dirty="0" smtClean="0"/>
+              <a:t>Algorytm </a:t>
+            </a:r>
+            <a:r>
+              <a:rPr lang="pl-PL" dirty="0"/>
+              <a:t>A* jest kompletny – w każdym przypadku znajdzie optymalną drogę i zakończy działanie, jeśli taka droga istnieje. </a:t>
+            </a:r>
+            <a:endParaRPr lang="pl-PL" dirty="0"/>
           </a:p>
         </p:txBody>
       </p:sp>
     </p:spTree>
     <p:extLst>
       <p:ext uri="{BB962C8B-B14F-4D97-AF65-F5344CB8AC3E}">
-        <p14:creationId xmlns:p14="http://schemas.microsoft.com/office/powerpoint/2010/main" val="4117595825"/>
+        <p14:creationId xmlns:p14="http://schemas.microsoft.com/office/powerpoint/2010/main" val="3667945494"/>
       </p:ext>
     </p:extLst>
   </p:cSld>
   <p:clrMapOvr>
     <a:masterClrMapping/>
   </p:clrMapOvr>
-</p:sld>
-</file>
-
-<file path=ppt/slides/slide8.xml><?xml version="1.0" encoding="utf-8"?>
-<p:sld xmlns:a="http://schemas.openxmlformats.org/drawingml/2006/main" xmlns:r="http://schemas.openxmlformats.org/officeDocument/2006/relationships" xmlns:p="http://schemas.openxmlformats.org/presentationml/2006/main">
-  <p:cSld>
-    <p:spTree>
-      <p:nvGrpSpPr>
-        <p:cNvPr id="1" name=""/>
-        <p:cNvGrpSpPr/>
-        <p:nvPr/>
-      </p:nvGrpSpPr>
-      <p:grpSpPr>
-        <a:xfrm>
-          <a:off x="0" y="0"/>
-          <a:ext cx="0" cy="0"/>
-          <a:chOff x="0" y="0"/>
-          <a:chExt cx="0" cy="0"/>
-        </a:xfrm>
-      </p:grpSpPr>
-      <p:sp>
-        <p:nvSpPr>
-          <p:cNvPr id="2" name="Tytuł 1"/>
-          <p:cNvSpPr>
-            <a:spLocks noGrp="1"/>
-          </p:cNvSpPr>
-          <p:nvPr>
-            <p:ph type="title"/>
-          </p:nvPr>
-        </p:nvSpPr>
-        <p:spPr/>
-        <p:txBody>
-          <a:bodyPr/>
-          <a:lstStyle/>
-          <a:p>
-            <a:r>
-              <a:rPr lang="pl-PL" dirty="0" smtClean="0"/>
-              <a:t>Generator labiryntów </a:t>
-            </a:r>
-            <a:r>
-              <a:rPr lang="pl-PL" dirty="0" err="1" smtClean="0"/>
-              <a:t>Hunt&amp;Kill</a:t>
-            </a:r>
-            <a:endParaRPr lang="pl-PL" dirty="0"/>
-          </a:p>
-        </p:txBody>
-      </p:sp>
-      <p:sp>
-        <p:nvSpPr>
-          <p:cNvPr id="3" name="Symbol zastępczy zawartości 2"/>
-          <p:cNvSpPr>
-            <a:spLocks noGrp="1"/>
-          </p:cNvSpPr>
-          <p:nvPr>
-            <p:ph idx="1"/>
-          </p:nvPr>
-        </p:nvSpPr>
-        <p:spPr/>
-        <p:txBody>
-          <a:bodyPr/>
-          <a:lstStyle/>
-          <a:p>
-            <a:r>
-              <a:rPr lang="pl-PL" dirty="0"/>
-              <a:t>http://weblog.jamisbuck.org/2011/1/24/maze-generation-hunt-and-kill-algorithm</a:t>
-            </a:r>
-          </a:p>
-        </p:txBody>
-      </p:sp>
-    </p:spTree>
-    <p:extLst>
-      <p:ext uri="{BB962C8B-B14F-4D97-AF65-F5344CB8AC3E}">
-        <p14:creationId xmlns:p14="http://schemas.microsoft.com/office/powerpoint/2010/main" val="586090659"/>
-      </p:ext>
-    </p:extLst>
-  </p:cSld>
-  <p:clrMapOvr>
-    <a:masterClrMapping/>
-  </p:clrMapOvr>
+  <p:timing>
+    <p:tnLst>
+      <p:par>
+        <p:cTn id="1" dur="indefinite" restart="never" nodeType="tmRoot"/>
+      </p:par>
+    </p:tnLst>
+  </p:timing>
 </p:sld>
 </file>
 
@@ -8733,4 +9393,265 @@
     </a:ext>
   </a:extLst>
 </a:theme>
+</file>
+
+<file path=ppt/theme/theme2.xml><?xml version="1.0" encoding="utf-8"?>
+<a:theme xmlns:a="http://schemas.openxmlformats.org/drawingml/2006/main" name="Motyw pakietu Office">
+  <a:themeElements>
+    <a:clrScheme name="Pakiet Office">
+      <a:dk1>
+        <a:sysClr val="windowText" lastClr="000000"/>
+      </a:dk1>
+      <a:lt1>
+        <a:sysClr val="window" lastClr="FFFFFF"/>
+      </a:lt1>
+      <a:dk2>
+        <a:srgbClr val="44546A"/>
+      </a:dk2>
+      <a:lt2>
+        <a:srgbClr val="E7E6E6"/>
+      </a:lt2>
+      <a:accent1>
+        <a:srgbClr val="5B9BD5"/>
+      </a:accent1>
+      <a:accent2>
+        <a:srgbClr val="ED7D31"/>
+      </a:accent2>
+      <a:accent3>
+        <a:srgbClr val="A5A5A5"/>
+      </a:accent3>
+      <a:accent4>
+        <a:srgbClr val="FFC000"/>
+      </a:accent4>
+      <a:accent5>
+        <a:srgbClr val="4472C4"/>
+      </a:accent5>
+      <a:accent6>
+        <a:srgbClr val="70AD47"/>
+      </a:accent6>
+      <a:hlink>
+        <a:srgbClr val="0563C1"/>
+      </a:hlink>
+      <a:folHlink>
+        <a:srgbClr val="954F72"/>
+      </a:folHlink>
+    </a:clrScheme>
+    <a:fontScheme name="Pakiet Office">
+      <a:majorFont>
+        <a:latin typeface="Calibri Light" panose="020F0302020204030204"/>
+        <a:ea typeface=""/>
+        <a:cs typeface=""/>
+        <a:font script="Jpan" typeface="游ゴシック Light"/>
+        <a:font script="Hang" typeface="맑은 고딕"/>
+        <a:font script="Hans" typeface="等线 Light"/>
+        <a:font script="Hant" typeface="新細明體"/>
+        <a:font script="Arab" typeface="Times New Roman"/>
+        <a:font script="Hebr" typeface="Times New Roman"/>
+        <a:font script="Thai" typeface="Angsana New"/>
+        <a:font script="Ethi" typeface="Nyala"/>
+        <a:font script="Beng" typeface="Vrinda"/>
+        <a:font script="Gujr" typeface="Shruti"/>
+        <a:font script="Khmr" typeface="MoolBoran"/>
+        <a:font script="Knda" typeface="Tunga"/>
+        <a:font script="Guru" typeface="Raavi"/>
+        <a:font script="Cans" typeface="Euphemia"/>
+        <a:font script="Cher" typeface="Plantagenet Cherokee"/>
+        <a:font script="Yiii" typeface="Microsoft Yi Baiti"/>
+        <a:font script="Tibt" typeface="Microsoft Himalaya"/>
+        <a:font script="Thaa" typeface="MV Boli"/>
+        <a:font script="Deva" typeface="Mangal"/>
+        <a:font script="Telu" typeface="Gautami"/>
+        <a:font script="Taml" typeface="Latha"/>
+        <a:font script="Syrc" typeface="Estrangelo Edessa"/>
+        <a:font script="Orya" typeface="Kalinga"/>
+        <a:font script="Mlym" typeface="Kartika"/>
+        <a:font script="Laoo" typeface="DokChampa"/>
+        <a:font script="Sinh" typeface="Iskoola Pota"/>
+        <a:font script="Mong" typeface="Mongolian Baiti"/>
+        <a:font script="Viet" typeface="Times New Roman"/>
+        <a:font script="Uigh" typeface="Microsoft Uighur"/>
+        <a:font script="Geor" typeface="Sylfaen"/>
+      </a:majorFont>
+      <a:minorFont>
+        <a:latin typeface="Calibri" panose="020F0502020204030204"/>
+        <a:ea typeface=""/>
+        <a:cs typeface=""/>
+        <a:font script="Jpan" typeface="游ゴシック"/>
+        <a:font script="Hang" typeface="맑은 고딕"/>
+        <a:font script="Hans" typeface="等线"/>
+        <a:font script="Hant" typeface="新細明體"/>
+        <a:font script="Arab" typeface="Arial"/>
+        <a:font script="Hebr" typeface="Arial"/>
+        <a:font script="Thai" typeface="Cordia New"/>
+        <a:font script="Ethi" typeface="Nyala"/>
+        <a:font script="Beng" typeface="Vrinda"/>
+        <a:font script="Gujr" typeface="Shruti"/>
+        <a:font script="Khmr" typeface="DaunPenh"/>
+        <a:font script="Knda" typeface="Tunga"/>
+        <a:font script="Guru" typeface="Raavi"/>
+        <a:font script="Cans" typeface="Euphemia"/>
+        <a:font script="Cher" typeface="Plantagenet Cherokee"/>
+        <a:font script="Yiii" typeface="Microsoft Yi Baiti"/>
+        <a:font script="Tibt" typeface="Microsoft Himalaya"/>
+        <a:font script="Thaa" typeface="MV Boli"/>
+        <a:font script="Deva" typeface="Mangal"/>
+        <a:font script="Telu" typeface="Gautami"/>
+        <a:font script="Taml" typeface="Latha"/>
+        <a:font script="Syrc" typeface="Estrangelo Edessa"/>
+        <a:font script="Orya" typeface="Kalinga"/>
+        <a:font script="Mlym" typeface="Kartika"/>
+        <a:font script="Laoo" typeface="DokChampa"/>
+        <a:font script="Sinh" typeface="Iskoola Pota"/>
+        <a:font script="Mong" typeface="Mongolian Baiti"/>
+        <a:font script="Viet" typeface="Arial"/>
+        <a:font script="Uigh" typeface="Microsoft Uighur"/>
+        <a:font script="Geor" typeface="Sylfaen"/>
+      </a:minorFont>
+    </a:fontScheme>
+    <a:fmtScheme name="Pakiet Office">
+      <a:fillStyleLst>
+        <a:solidFill>
+          <a:schemeClr val="phClr"/>
+        </a:solidFill>
+        <a:gradFill rotWithShape="1">
+          <a:gsLst>
+            <a:gs pos="0">
+              <a:schemeClr val="phClr">
+                <a:lumMod val="110000"/>
+                <a:satMod val="105000"/>
+                <a:tint val="67000"/>
+              </a:schemeClr>
+            </a:gs>
+            <a:gs pos="50000">
+              <a:schemeClr val="phClr">
+                <a:lumMod val="105000"/>
+                <a:satMod val="103000"/>
+                <a:tint val="73000"/>
+              </a:schemeClr>
+            </a:gs>
+            <a:gs pos="100000">
+              <a:schemeClr val="phClr">
+                <a:lumMod val="105000"/>
+                <a:satMod val="109000"/>
+                <a:tint val="81000"/>
+              </a:schemeClr>
+            </a:gs>
+          </a:gsLst>
+          <a:lin ang="5400000" scaled="0"/>
+        </a:gradFill>
+        <a:gradFill rotWithShape="1">
+          <a:gsLst>
+            <a:gs pos="0">
+              <a:schemeClr val="phClr">
+                <a:satMod val="103000"/>
+                <a:lumMod val="102000"/>
+                <a:tint val="94000"/>
+              </a:schemeClr>
+            </a:gs>
+            <a:gs pos="50000">
+              <a:schemeClr val="phClr">
+                <a:satMod val="110000"/>
+                <a:lumMod val="100000"/>
+                <a:shade val="100000"/>
+              </a:schemeClr>
+            </a:gs>
+            <a:gs pos="100000">
+              <a:schemeClr val="phClr">
+                <a:lumMod val="99000"/>
+                <a:satMod val="120000"/>
+                <a:shade val="78000"/>
+              </a:schemeClr>
+            </a:gs>
+          </a:gsLst>
+          <a:lin ang="5400000" scaled="0"/>
+        </a:gradFill>
+      </a:fillStyleLst>
+      <a:lnStyleLst>
+        <a:ln w="6350" cap="flat" cmpd="sng" algn="ctr">
+          <a:solidFill>
+            <a:schemeClr val="phClr"/>
+          </a:solidFill>
+          <a:prstDash val="solid"/>
+          <a:miter lim="800000"/>
+        </a:ln>
+        <a:ln w="12700" cap="flat" cmpd="sng" algn="ctr">
+          <a:solidFill>
+            <a:schemeClr val="phClr"/>
+          </a:solidFill>
+          <a:prstDash val="solid"/>
+          <a:miter lim="800000"/>
+        </a:ln>
+        <a:ln w="19050" cap="flat" cmpd="sng" algn="ctr">
+          <a:solidFill>
+            <a:schemeClr val="phClr"/>
+          </a:solidFill>
+          <a:prstDash val="solid"/>
+          <a:miter lim="800000"/>
+        </a:ln>
+      </a:lnStyleLst>
+      <a:effectStyleLst>
+        <a:effectStyle>
+          <a:effectLst/>
+        </a:effectStyle>
+        <a:effectStyle>
+          <a:effectLst/>
+        </a:effectStyle>
+        <a:effectStyle>
+          <a:effectLst>
+            <a:outerShdw blurRad="57150" dist="19050" dir="5400000" algn="ctr" rotWithShape="0">
+              <a:srgbClr val="000000">
+                <a:alpha val="63000"/>
+              </a:srgbClr>
+            </a:outerShdw>
+          </a:effectLst>
+        </a:effectStyle>
+      </a:effectStyleLst>
+      <a:bgFillStyleLst>
+        <a:solidFill>
+          <a:schemeClr val="phClr"/>
+        </a:solidFill>
+        <a:solidFill>
+          <a:schemeClr val="phClr">
+            <a:tint val="95000"/>
+            <a:satMod val="170000"/>
+          </a:schemeClr>
+        </a:solidFill>
+        <a:gradFill rotWithShape="1">
+          <a:gsLst>
+            <a:gs pos="0">
+              <a:schemeClr val="phClr">
+                <a:tint val="93000"/>
+                <a:satMod val="150000"/>
+                <a:shade val="98000"/>
+                <a:lumMod val="102000"/>
+              </a:schemeClr>
+            </a:gs>
+            <a:gs pos="50000">
+              <a:schemeClr val="phClr">
+                <a:tint val="98000"/>
+                <a:satMod val="130000"/>
+                <a:shade val="90000"/>
+                <a:lumMod val="103000"/>
+              </a:schemeClr>
+            </a:gs>
+            <a:gs pos="100000">
+              <a:schemeClr val="phClr">
+                <a:shade val="63000"/>
+                <a:satMod val="120000"/>
+              </a:schemeClr>
+            </a:gs>
+          </a:gsLst>
+          <a:lin ang="5400000" scaled="0"/>
+        </a:gradFill>
+      </a:bgFillStyleLst>
+    </a:fmtScheme>
+  </a:themeElements>
+  <a:objectDefaults/>
+  <a:extraClrSchemeLst/>
+  <a:extLst>
+    <a:ext uri="{05A4C25C-085E-4340-85A3-A5531E510DB2}">
+      <thm15:themeFamily xmlns:thm15="http://schemas.microsoft.com/office/thememl/2012/main" name="Office Theme" id="{62F939B6-93AF-4DB8-9C6B-D6C7DFDC589F}" vid="{4A3C46E8-61CC-4603-A589-7422A47A8E4A}"/>
+    </a:ext>
+  </a:extLst>
+</a:theme>
 </file>
</xml_diff>

<commit_message>
Plik z dokumentacją dodany
</commit_message>
<xml_diff>
--- a/Prezentacje/Prez 2 - oceniana.pptx
+++ b/Prezentacje/Prez 2 - oceniana.pptx
@@ -4,11 +4,17 @@
   <p:sldMasterIdLst>
     <p:sldMasterId id="2147483660" r:id="rId1"/>
   </p:sldMasterIdLst>
+  <p:notesMasterIdLst>
+    <p:notesMasterId r:id="rId9"/>
+  </p:notesMasterIdLst>
   <p:sldIdLst>
     <p:sldId id="256" r:id="rId2"/>
     <p:sldId id="257" r:id="rId3"/>
     <p:sldId id="259" r:id="rId4"/>
-    <p:sldId id="260" r:id="rId5"/>
+    <p:sldId id="263" r:id="rId5"/>
+    <p:sldId id="266" r:id="rId6"/>
+    <p:sldId id="262" r:id="rId7"/>
+    <p:sldId id="261" r:id="rId8"/>
   </p:sldIdLst>
   <p:sldSz cx="12192000" cy="6858000"/>
   <p:notesSz cx="6858000" cy="9144000"/>
@@ -115,6 +121,440 @@
 </p:presentation>
 </file>
 
+<file path=ppt/notesMasters/notesMaster1.xml><?xml version="1.0" encoding="utf-8"?>
+<p:notesMaster xmlns:a="http://schemas.openxmlformats.org/drawingml/2006/main" xmlns:r="http://schemas.openxmlformats.org/officeDocument/2006/relationships" xmlns:p="http://schemas.openxmlformats.org/presentationml/2006/main">
+  <p:cSld>
+    <p:bg>
+      <p:bgRef idx="1001">
+        <a:schemeClr val="bg1"/>
+      </p:bgRef>
+    </p:bg>
+    <p:spTree>
+      <p:nvGrpSpPr>
+        <p:cNvPr id="1" name=""/>
+        <p:cNvGrpSpPr/>
+        <p:nvPr/>
+      </p:nvGrpSpPr>
+      <p:grpSpPr>
+        <a:xfrm>
+          <a:off x="0" y="0"/>
+          <a:ext cx="0" cy="0"/>
+          <a:chOff x="0" y="0"/>
+          <a:chExt cx="0" cy="0"/>
+        </a:xfrm>
+      </p:grpSpPr>
+      <p:sp>
+        <p:nvSpPr>
+          <p:cNvPr id="2" name="Symbol zastępczy nagłówka 1"/>
+          <p:cNvSpPr>
+            <a:spLocks noGrp="1"/>
+          </p:cNvSpPr>
+          <p:nvPr>
+            <p:ph type="hdr" sz="quarter"/>
+          </p:nvPr>
+        </p:nvSpPr>
+        <p:spPr>
+          <a:xfrm>
+            <a:off x="0" y="0"/>
+            <a:ext cx="2971800" cy="458788"/>
+          </a:xfrm>
+          <a:prstGeom prst="rect">
+            <a:avLst/>
+          </a:prstGeom>
+        </p:spPr>
+        <p:txBody>
+          <a:bodyPr vert="horz" lIns="91440" tIns="45720" rIns="91440" bIns="45720" rtlCol="0"/>
+          <a:lstStyle>
+            <a:lvl1pPr algn="l">
+              <a:defRPr sz="1200"/>
+            </a:lvl1pPr>
+          </a:lstStyle>
+          <a:p>
+            <a:endParaRPr lang="pl-PL"/>
+          </a:p>
+        </p:txBody>
+      </p:sp>
+      <p:sp>
+        <p:nvSpPr>
+          <p:cNvPr id="3" name="Symbol zastępczy daty 2"/>
+          <p:cNvSpPr>
+            <a:spLocks noGrp="1"/>
+          </p:cNvSpPr>
+          <p:nvPr>
+            <p:ph type="dt" idx="1"/>
+          </p:nvPr>
+        </p:nvSpPr>
+        <p:spPr>
+          <a:xfrm>
+            <a:off x="3884613" y="0"/>
+            <a:ext cx="2971800" cy="458788"/>
+          </a:xfrm>
+          <a:prstGeom prst="rect">
+            <a:avLst/>
+          </a:prstGeom>
+        </p:spPr>
+        <p:txBody>
+          <a:bodyPr vert="horz" lIns="91440" tIns="45720" rIns="91440" bIns="45720" rtlCol="0"/>
+          <a:lstStyle>
+            <a:lvl1pPr algn="r">
+              <a:defRPr sz="1200"/>
+            </a:lvl1pPr>
+          </a:lstStyle>
+          <a:p>
+            <a:fld id="{926C557F-30A5-4215-B53D-D4E129459BD9}" type="datetimeFigureOut">
+              <a:rPr lang="pl-PL" smtClean="0"/>
+              <a:t>06.11.2018</a:t>
+            </a:fld>
+            <a:endParaRPr lang="pl-PL"/>
+          </a:p>
+        </p:txBody>
+      </p:sp>
+      <p:sp>
+        <p:nvSpPr>
+          <p:cNvPr id="4" name="Symbol zastępczy obrazu slajdu 3"/>
+          <p:cNvSpPr>
+            <a:spLocks noGrp="1" noRot="1" noChangeAspect="1"/>
+          </p:cNvSpPr>
+          <p:nvPr>
+            <p:ph type="sldImg" idx="2"/>
+          </p:nvPr>
+        </p:nvSpPr>
+        <p:spPr>
+          <a:xfrm>
+            <a:off x="685800" y="1143000"/>
+            <a:ext cx="5486400" cy="3086100"/>
+          </a:xfrm>
+          <a:prstGeom prst="rect">
+            <a:avLst/>
+          </a:prstGeom>
+          <a:noFill/>
+          <a:ln w="12700">
+            <a:solidFill>
+              <a:prstClr val="black"/>
+            </a:solidFill>
+          </a:ln>
+        </p:spPr>
+        <p:txBody>
+          <a:bodyPr vert="horz" lIns="91440" tIns="45720" rIns="91440" bIns="45720" rtlCol="0" anchor="ctr"/>
+          <a:lstStyle/>
+          <a:p>
+            <a:endParaRPr lang="pl-PL"/>
+          </a:p>
+        </p:txBody>
+      </p:sp>
+      <p:sp>
+        <p:nvSpPr>
+          <p:cNvPr id="5" name="Symbol zastępczy notatek 4"/>
+          <p:cNvSpPr>
+            <a:spLocks noGrp="1"/>
+          </p:cNvSpPr>
+          <p:nvPr>
+            <p:ph type="body" sz="quarter" idx="3"/>
+          </p:nvPr>
+        </p:nvSpPr>
+        <p:spPr>
+          <a:xfrm>
+            <a:off x="685800" y="4400550"/>
+            <a:ext cx="5486400" cy="3600450"/>
+          </a:xfrm>
+          <a:prstGeom prst="rect">
+            <a:avLst/>
+          </a:prstGeom>
+        </p:spPr>
+        <p:txBody>
+          <a:bodyPr vert="horz" lIns="91440" tIns="45720" rIns="91440" bIns="45720" rtlCol="0"/>
+          <a:lstStyle/>
+          <a:p>
+            <a:pPr lvl="0"/>
+            <a:r>
+              <a:rPr lang="pl-PL" smtClean="0"/>
+              <a:t>Edytuj style wzorca tekstu</a:t>
+            </a:r>
+          </a:p>
+          <a:p>
+            <a:pPr lvl="1"/>
+            <a:r>
+              <a:rPr lang="pl-PL" smtClean="0"/>
+              <a:t>Drugi poziom</a:t>
+            </a:r>
+          </a:p>
+          <a:p>
+            <a:pPr lvl="2"/>
+            <a:r>
+              <a:rPr lang="pl-PL" smtClean="0"/>
+              <a:t>Trzeci poziom</a:t>
+            </a:r>
+          </a:p>
+          <a:p>
+            <a:pPr lvl="3"/>
+            <a:r>
+              <a:rPr lang="pl-PL" smtClean="0"/>
+              <a:t>Czwarty poziom</a:t>
+            </a:r>
+          </a:p>
+          <a:p>
+            <a:pPr lvl="4"/>
+            <a:r>
+              <a:rPr lang="pl-PL" smtClean="0"/>
+              <a:t>Piąty poziom</a:t>
+            </a:r>
+            <a:endParaRPr lang="pl-PL"/>
+          </a:p>
+        </p:txBody>
+      </p:sp>
+      <p:sp>
+        <p:nvSpPr>
+          <p:cNvPr id="6" name="Symbol zastępczy stopki 5"/>
+          <p:cNvSpPr>
+            <a:spLocks noGrp="1"/>
+          </p:cNvSpPr>
+          <p:nvPr>
+            <p:ph type="ftr" sz="quarter" idx="4"/>
+          </p:nvPr>
+        </p:nvSpPr>
+        <p:spPr>
+          <a:xfrm>
+            <a:off x="0" y="8685213"/>
+            <a:ext cx="2971800" cy="458787"/>
+          </a:xfrm>
+          <a:prstGeom prst="rect">
+            <a:avLst/>
+          </a:prstGeom>
+        </p:spPr>
+        <p:txBody>
+          <a:bodyPr vert="horz" lIns="91440" tIns="45720" rIns="91440" bIns="45720" rtlCol="0" anchor="b"/>
+          <a:lstStyle>
+            <a:lvl1pPr algn="l">
+              <a:defRPr sz="1200"/>
+            </a:lvl1pPr>
+          </a:lstStyle>
+          <a:p>
+            <a:endParaRPr lang="pl-PL"/>
+          </a:p>
+        </p:txBody>
+      </p:sp>
+      <p:sp>
+        <p:nvSpPr>
+          <p:cNvPr id="7" name="Symbol zastępczy numeru slajdu 6"/>
+          <p:cNvSpPr>
+            <a:spLocks noGrp="1"/>
+          </p:cNvSpPr>
+          <p:nvPr>
+            <p:ph type="sldNum" sz="quarter" idx="5"/>
+          </p:nvPr>
+        </p:nvSpPr>
+        <p:spPr>
+          <a:xfrm>
+            <a:off x="3884613" y="8685213"/>
+            <a:ext cx="2971800" cy="458787"/>
+          </a:xfrm>
+          <a:prstGeom prst="rect">
+            <a:avLst/>
+          </a:prstGeom>
+        </p:spPr>
+        <p:txBody>
+          <a:bodyPr vert="horz" lIns="91440" tIns="45720" rIns="91440" bIns="45720" rtlCol="0" anchor="b"/>
+          <a:lstStyle>
+            <a:lvl1pPr algn="r">
+              <a:defRPr sz="1200"/>
+            </a:lvl1pPr>
+          </a:lstStyle>
+          <a:p>
+            <a:fld id="{13CBE2B1-6275-4A4A-A80C-30980AACC1D9}" type="slidenum">
+              <a:rPr lang="pl-PL" smtClean="0"/>
+              <a:t>‹#›</a:t>
+            </a:fld>
+            <a:endParaRPr lang="pl-PL"/>
+          </a:p>
+        </p:txBody>
+      </p:sp>
+    </p:spTree>
+    <p:extLst>
+      <p:ext uri="{BB962C8B-B14F-4D97-AF65-F5344CB8AC3E}">
+        <p14:creationId xmlns:p14="http://schemas.microsoft.com/office/powerpoint/2010/main" val="3800144351"/>
+      </p:ext>
+    </p:extLst>
+  </p:cSld>
+  <p:clrMap bg1="lt1" tx1="dk1" bg2="lt2" tx2="dk2" accent1="accent1" accent2="accent2" accent3="accent3" accent4="accent4" accent5="accent5" accent6="accent6" hlink="hlink" folHlink="folHlink"/>
+  <p:notesStyle>
+    <a:lvl1pPr marL="0" algn="l" defTabSz="914400" rtl="0" eaLnBrk="1" latinLnBrk="0" hangingPunct="1">
+      <a:defRPr sz="1200" kern="1200">
+        <a:solidFill>
+          <a:schemeClr val="tx1"/>
+        </a:solidFill>
+        <a:latin typeface="+mn-lt"/>
+        <a:ea typeface="+mn-ea"/>
+        <a:cs typeface="+mn-cs"/>
+      </a:defRPr>
+    </a:lvl1pPr>
+    <a:lvl2pPr marL="457200" algn="l" defTabSz="914400" rtl="0" eaLnBrk="1" latinLnBrk="0" hangingPunct="1">
+      <a:defRPr sz="1200" kern="1200">
+        <a:solidFill>
+          <a:schemeClr val="tx1"/>
+        </a:solidFill>
+        <a:latin typeface="+mn-lt"/>
+        <a:ea typeface="+mn-ea"/>
+        <a:cs typeface="+mn-cs"/>
+      </a:defRPr>
+    </a:lvl2pPr>
+    <a:lvl3pPr marL="914400" algn="l" defTabSz="914400" rtl="0" eaLnBrk="1" latinLnBrk="0" hangingPunct="1">
+      <a:defRPr sz="1200" kern="1200">
+        <a:solidFill>
+          <a:schemeClr val="tx1"/>
+        </a:solidFill>
+        <a:latin typeface="+mn-lt"/>
+        <a:ea typeface="+mn-ea"/>
+        <a:cs typeface="+mn-cs"/>
+      </a:defRPr>
+    </a:lvl3pPr>
+    <a:lvl4pPr marL="1371600" algn="l" defTabSz="914400" rtl="0" eaLnBrk="1" latinLnBrk="0" hangingPunct="1">
+      <a:defRPr sz="1200" kern="1200">
+        <a:solidFill>
+          <a:schemeClr val="tx1"/>
+        </a:solidFill>
+        <a:latin typeface="+mn-lt"/>
+        <a:ea typeface="+mn-ea"/>
+        <a:cs typeface="+mn-cs"/>
+      </a:defRPr>
+    </a:lvl4pPr>
+    <a:lvl5pPr marL="1828800" algn="l" defTabSz="914400" rtl="0" eaLnBrk="1" latinLnBrk="0" hangingPunct="1">
+      <a:defRPr sz="1200" kern="1200">
+        <a:solidFill>
+          <a:schemeClr val="tx1"/>
+        </a:solidFill>
+        <a:latin typeface="+mn-lt"/>
+        <a:ea typeface="+mn-ea"/>
+        <a:cs typeface="+mn-cs"/>
+      </a:defRPr>
+    </a:lvl5pPr>
+    <a:lvl6pPr marL="2286000" algn="l" defTabSz="914400" rtl="0" eaLnBrk="1" latinLnBrk="0" hangingPunct="1">
+      <a:defRPr sz="1200" kern="1200">
+        <a:solidFill>
+          <a:schemeClr val="tx1"/>
+        </a:solidFill>
+        <a:latin typeface="+mn-lt"/>
+        <a:ea typeface="+mn-ea"/>
+        <a:cs typeface="+mn-cs"/>
+      </a:defRPr>
+    </a:lvl6pPr>
+    <a:lvl7pPr marL="2743200" algn="l" defTabSz="914400" rtl="0" eaLnBrk="1" latinLnBrk="0" hangingPunct="1">
+      <a:defRPr sz="1200" kern="1200">
+        <a:solidFill>
+          <a:schemeClr val="tx1"/>
+        </a:solidFill>
+        <a:latin typeface="+mn-lt"/>
+        <a:ea typeface="+mn-ea"/>
+        <a:cs typeface="+mn-cs"/>
+      </a:defRPr>
+    </a:lvl7pPr>
+    <a:lvl8pPr marL="3200400" algn="l" defTabSz="914400" rtl="0" eaLnBrk="1" latinLnBrk="0" hangingPunct="1">
+      <a:defRPr sz="1200" kern="1200">
+        <a:solidFill>
+          <a:schemeClr val="tx1"/>
+        </a:solidFill>
+        <a:latin typeface="+mn-lt"/>
+        <a:ea typeface="+mn-ea"/>
+        <a:cs typeface="+mn-cs"/>
+      </a:defRPr>
+    </a:lvl8pPr>
+    <a:lvl9pPr marL="3657600" algn="l" defTabSz="914400" rtl="0" eaLnBrk="1" latinLnBrk="0" hangingPunct="1">
+      <a:defRPr sz="1200" kern="1200">
+        <a:solidFill>
+          <a:schemeClr val="tx1"/>
+        </a:solidFill>
+        <a:latin typeface="+mn-lt"/>
+        <a:ea typeface="+mn-ea"/>
+        <a:cs typeface="+mn-cs"/>
+      </a:defRPr>
+    </a:lvl9pPr>
+  </p:notesStyle>
+</p:notesMaster>
+</file>
+
+<file path=ppt/notesSlides/notesSlide1.xml><?xml version="1.0" encoding="utf-8"?>
+<p:notes xmlns:a="http://schemas.openxmlformats.org/drawingml/2006/main" xmlns:r="http://schemas.openxmlformats.org/officeDocument/2006/relationships" xmlns:p="http://schemas.openxmlformats.org/presentationml/2006/main">
+  <p:cSld>
+    <p:spTree>
+      <p:nvGrpSpPr>
+        <p:cNvPr id="1" name=""/>
+        <p:cNvGrpSpPr/>
+        <p:nvPr/>
+      </p:nvGrpSpPr>
+      <p:grpSpPr>
+        <a:xfrm>
+          <a:off x="0" y="0"/>
+          <a:ext cx="0" cy="0"/>
+          <a:chOff x="0" y="0"/>
+          <a:chExt cx="0" cy="0"/>
+        </a:xfrm>
+      </p:grpSpPr>
+      <p:sp>
+        <p:nvSpPr>
+          <p:cNvPr id="2" name="Symbol zastępczy obrazu slajdu 1"/>
+          <p:cNvSpPr>
+            <a:spLocks noGrp="1" noRot="1" noChangeAspect="1"/>
+          </p:cNvSpPr>
+          <p:nvPr>
+            <p:ph type="sldImg"/>
+          </p:nvPr>
+        </p:nvSpPr>
+        <p:spPr/>
+      </p:sp>
+      <p:sp>
+        <p:nvSpPr>
+          <p:cNvPr id="3" name="Symbol zastępczy notatek 2"/>
+          <p:cNvSpPr>
+            <a:spLocks noGrp="1"/>
+          </p:cNvSpPr>
+          <p:nvPr>
+            <p:ph type="body" idx="1"/>
+          </p:nvPr>
+        </p:nvSpPr>
+        <p:spPr/>
+        <p:txBody>
+          <a:bodyPr/>
+          <a:lstStyle/>
+          <a:p>
+            <a:endParaRPr lang="pl-PL" dirty="0"/>
+          </a:p>
+        </p:txBody>
+      </p:sp>
+      <p:sp>
+        <p:nvSpPr>
+          <p:cNvPr id="4" name="Symbol zastępczy numeru slajdu 3"/>
+          <p:cNvSpPr>
+            <a:spLocks noGrp="1"/>
+          </p:cNvSpPr>
+          <p:nvPr>
+            <p:ph type="sldNum" sz="quarter" idx="10"/>
+          </p:nvPr>
+        </p:nvSpPr>
+        <p:spPr/>
+        <p:txBody>
+          <a:bodyPr/>
+          <a:lstStyle/>
+          <a:p>
+            <a:fld id="{13CBE2B1-6275-4A4A-A80C-30980AACC1D9}" type="slidenum">
+              <a:rPr lang="pl-PL" smtClean="0"/>
+              <a:t>7</a:t>
+            </a:fld>
+            <a:endParaRPr lang="pl-PL"/>
+          </a:p>
+        </p:txBody>
+      </p:sp>
+    </p:spTree>
+    <p:extLst>
+      <p:ext uri="{BB962C8B-B14F-4D97-AF65-F5344CB8AC3E}">
+        <p14:creationId xmlns:p14="http://schemas.microsoft.com/office/powerpoint/2010/main" val="577291071"/>
+      </p:ext>
+    </p:extLst>
+  </p:cSld>
+  <p:clrMapOvr>
+    <a:masterClrMapping/>
+  </p:clrMapOvr>
+</p:notes>
+</file>
+
 <file path=ppt/slideLayouts/slideLayout1.xml><?xml version="1.0" encoding="utf-8"?>
 <p:sldLayout xmlns:a="http://schemas.openxmlformats.org/drawingml/2006/main" xmlns:r="http://schemas.openxmlformats.org/officeDocument/2006/relationships" xmlns:p="http://schemas.openxmlformats.org/presentationml/2006/main" type="title" preserve="1">
   <p:cSld name="Slajd tytułowy">
@@ -389,7 +829,7 @@
           <a:p>
             <a:fld id="{64E4A20C-1B45-45EA-981D-556B4E5457AC}" type="datetimeFigureOut">
               <a:rPr lang="pl-PL" smtClean="0"/>
-              <a:t>05.11.2018</a:t>
+              <a:t>06.11.2018</a:t>
             </a:fld>
             <a:endParaRPr lang="pl-PL"/>
           </a:p>
@@ -803,7 +1243,7 @@
           <a:p>
             <a:fld id="{64E4A20C-1B45-45EA-981D-556B4E5457AC}" type="datetimeFigureOut">
               <a:rPr lang="pl-PL" smtClean="0"/>
-              <a:t>05.11.2018</a:t>
+              <a:t>06.11.2018</a:t>
             </a:fld>
             <a:endParaRPr lang="pl-PL"/>
           </a:p>
@@ -1139,7 +1579,7 @@
           <a:p>
             <a:fld id="{64E4A20C-1B45-45EA-981D-556B4E5457AC}" type="datetimeFigureOut">
               <a:rPr lang="pl-PL" smtClean="0"/>
-              <a:t>05.11.2018</a:t>
+              <a:t>06.11.2018</a:t>
             </a:fld>
             <a:endParaRPr lang="pl-PL"/>
           </a:p>
@@ -1544,7 +1984,7 @@
           <a:p>
             <a:fld id="{64E4A20C-1B45-45EA-981D-556B4E5457AC}" type="datetimeFigureOut">
               <a:rPr lang="pl-PL" smtClean="0"/>
-              <a:t>05.11.2018</a:t>
+              <a:t>06.11.2018</a:t>
             </a:fld>
             <a:endParaRPr lang="pl-PL"/>
           </a:p>
@@ -2112,7 +2552,7 @@
           <a:p>
             <a:fld id="{64E4A20C-1B45-45EA-981D-556B4E5457AC}" type="datetimeFigureOut">
               <a:rPr lang="pl-PL" smtClean="0"/>
-              <a:t>05.11.2018</a:t>
+              <a:t>06.11.2018</a:t>
             </a:fld>
             <a:endParaRPr lang="pl-PL"/>
           </a:p>
@@ -2793,7 +3233,7 @@
           <a:p>
             <a:fld id="{64E4A20C-1B45-45EA-981D-556B4E5457AC}" type="datetimeFigureOut">
               <a:rPr lang="pl-PL" smtClean="0"/>
-              <a:t>05.11.2018</a:t>
+              <a:t>06.11.2018</a:t>
             </a:fld>
             <a:endParaRPr lang="pl-PL"/>
           </a:p>
@@ -3706,7 +4146,7 @@
           <a:p>
             <a:fld id="{64E4A20C-1B45-45EA-981D-556B4E5457AC}" type="datetimeFigureOut">
               <a:rPr lang="pl-PL" smtClean="0"/>
-              <a:t>05.11.2018</a:t>
+              <a:t>06.11.2018</a:t>
             </a:fld>
             <a:endParaRPr lang="pl-PL"/>
           </a:p>
@@ -4019,7 +4459,7 @@
           <a:p>
             <a:fld id="{64E4A20C-1B45-45EA-981D-556B4E5457AC}" type="datetimeFigureOut">
               <a:rPr lang="pl-PL" smtClean="0"/>
-              <a:t>05.11.2018</a:t>
+              <a:t>06.11.2018</a:t>
             </a:fld>
             <a:endParaRPr lang="pl-PL"/>
           </a:p>
@@ -4283,7 +4723,7 @@
           <a:p>
             <a:fld id="{64E4A20C-1B45-45EA-981D-556B4E5457AC}" type="datetimeFigureOut">
               <a:rPr lang="pl-PL" smtClean="0"/>
-              <a:t>05.11.2018</a:t>
+              <a:t>06.11.2018</a:t>
             </a:fld>
             <a:endParaRPr lang="pl-PL"/>
           </a:p>
@@ -4606,7 +5046,7 @@
           <a:p>
             <a:fld id="{64E4A20C-1B45-45EA-981D-556B4E5457AC}" type="datetimeFigureOut">
               <a:rPr lang="pl-PL" smtClean="0"/>
-              <a:t>05.11.2018</a:t>
+              <a:t>06.11.2018</a:t>
             </a:fld>
             <a:endParaRPr lang="pl-PL"/>
           </a:p>
@@ -4995,7 +5435,7 @@
           <a:p>
             <a:fld id="{64E4A20C-1B45-45EA-981D-556B4E5457AC}" type="datetimeFigureOut">
               <a:rPr lang="pl-PL" smtClean="0"/>
-              <a:t>05.11.2018</a:t>
+              <a:t>06.11.2018</a:t>
             </a:fld>
             <a:endParaRPr lang="pl-PL"/>
           </a:p>
@@ -5371,7 +5811,7 @@
           <a:p>
             <a:fld id="{64E4A20C-1B45-45EA-981D-556B4E5457AC}" type="datetimeFigureOut">
               <a:rPr lang="pl-PL" smtClean="0"/>
-              <a:t>05.11.2018</a:t>
+              <a:t>06.11.2018</a:t>
             </a:fld>
             <a:endParaRPr lang="pl-PL"/>
           </a:p>
@@ -5877,7 +6317,7 @@
           <a:p>
             <a:fld id="{64E4A20C-1B45-45EA-981D-556B4E5457AC}" type="datetimeFigureOut">
               <a:rPr lang="pl-PL" smtClean="0"/>
-              <a:t>05.11.2018</a:t>
+              <a:t>06.11.2018</a:t>
             </a:fld>
             <a:endParaRPr lang="pl-PL"/>
           </a:p>
@@ -6134,7 +6574,7 @@
           <a:p>
             <a:fld id="{64E4A20C-1B45-45EA-981D-556B4E5457AC}" type="datetimeFigureOut">
               <a:rPr lang="pl-PL" smtClean="0"/>
-              <a:t>05.11.2018</a:t>
+              <a:t>06.11.2018</a:t>
             </a:fld>
             <a:endParaRPr lang="pl-PL"/>
           </a:p>
@@ -6297,7 +6737,7 @@
           <a:p>
             <a:fld id="{64E4A20C-1B45-45EA-981D-556B4E5457AC}" type="datetimeFigureOut">
               <a:rPr lang="pl-PL" smtClean="0"/>
-              <a:t>05.11.2018</a:t>
+              <a:t>06.11.2018</a:t>
             </a:fld>
             <a:endParaRPr lang="pl-PL"/>
           </a:p>
@@ -6687,7 +7127,7 @@
           <a:p>
             <a:fld id="{64E4A20C-1B45-45EA-981D-556B4E5457AC}" type="datetimeFigureOut">
               <a:rPr lang="pl-PL" smtClean="0"/>
-              <a:t>05.11.2018</a:t>
+              <a:t>06.11.2018</a:t>
             </a:fld>
             <a:endParaRPr lang="pl-PL"/>
           </a:p>
@@ -7096,7 +7536,7 @@
           <a:p>
             <a:fld id="{64E4A20C-1B45-45EA-981D-556B4E5457AC}" type="datetimeFigureOut">
               <a:rPr lang="pl-PL" smtClean="0"/>
-              <a:t>05.11.2018</a:t>
+              <a:t>06.11.2018</a:t>
             </a:fld>
             <a:endParaRPr lang="pl-PL"/>
           </a:p>
@@ -7340,7 +7780,7 @@
           <a:p>
             <a:fld id="{64E4A20C-1B45-45EA-981D-556B4E5457AC}" type="datetimeFigureOut">
               <a:rPr lang="pl-PL" smtClean="0"/>
-              <a:t>05.11.2018</a:t>
+              <a:t>06.11.2018</a:t>
             </a:fld>
             <a:endParaRPr lang="pl-PL"/>
           </a:p>
@@ -7830,6 +8270,13 @@
   <p:clrMapOvr>
     <a:masterClrMapping/>
   </p:clrMapOvr>
+  <p:timing>
+    <p:tnLst>
+      <p:par>
+        <p:cTn id="1" dur="indefinite" restart="never" nodeType="tmRoot"/>
+      </p:par>
+    </p:tnLst>
+  </p:timing>
 </p:sld>
 </file>
 
@@ -7939,6 +8386,13 @@
   <p:clrMapOvr>
     <a:masterClrMapping/>
   </p:clrMapOvr>
+  <p:timing>
+    <p:tnLst>
+      <p:par>
+        <p:cTn id="1" dur="indefinite" restart="never" nodeType="tmRoot"/>
+      </p:par>
+    </p:tnLst>
+  </p:timing>
 </p:sld>
 </file>
 
@@ -8043,6 +8497,13 @@
   <p:clrMapOvr>
     <a:masterClrMapping/>
   </p:clrMapOvr>
+  <p:timing>
+    <p:tnLst>
+      <p:par>
+        <p:cTn id="1" dur="indefinite" restart="never" nodeType="tmRoot"/>
+      </p:par>
+    </p:tnLst>
+  </p:timing>
 </p:sld>
 </file>
 
@@ -8080,25 +8541,65 @@
           <a:p>
             <a:r>
               <a:rPr lang="pl-PL" dirty="0" smtClean="0"/>
-              <a:t>Proceduralne generowanie mapy</a:t>
+              <a:t>Proceduralne generowanie </a:t>
+            </a:r>
+            <a:r>
+              <a:rPr lang="pl-PL" dirty="0" smtClean="0"/>
+              <a:t>terenu – szum Perlina</a:t>
             </a:r>
             <a:endParaRPr lang="pl-PL" dirty="0"/>
           </a:p>
         </p:txBody>
       </p:sp>
-      <p:sp>
-        <p:nvSpPr>
-          <p:cNvPr id="3" name="Symbol zastępczy zawartości 2"/>
-          <p:cNvSpPr>
-            <a:spLocks noGrp="1"/>
-          </p:cNvSpPr>
-          <p:nvPr>
-            <p:ph idx="1"/>
-          </p:nvPr>
-        </p:nvSpPr>
-        <p:spPr/>
-        <p:txBody>
-          <a:bodyPr/>
+      <p:pic>
+        <p:nvPicPr>
+          <p:cNvPr id="6" name="Symbol zastępczy zawartości 5"/>
+          <p:cNvPicPr>
+            <a:picLocks noGrp="1" noChangeAspect="1"/>
+          </p:cNvPicPr>
+          <p:nvPr>
+            <p:ph sz="half" idx="1"/>
+          </p:nvPr>
+        </p:nvPicPr>
+        <p:blipFill>
+          <a:blip r:embed="rId2">
+            <a:extLst>
+              <a:ext uri="{28A0092B-C50C-407E-A947-70E740481C1C}">
+                <a14:useLocalDpi xmlns:a14="http://schemas.microsoft.com/office/drawing/2010/main" val="0"/>
+              </a:ext>
+            </a:extLst>
+          </a:blip>
+          <a:stretch>
+            <a:fillRect/>
+          </a:stretch>
+        </p:blipFill>
+        <p:spPr>
+          <a:xfrm>
+            <a:off x="680321" y="2336873"/>
+            <a:ext cx="3599316" cy="3599316"/>
+          </a:xfrm>
+        </p:spPr>
+      </p:pic>
+      <p:sp>
+        <p:nvSpPr>
+          <p:cNvPr id="5" name="Symbol zastępczy zawartości 4"/>
+          <p:cNvSpPr>
+            <a:spLocks noGrp="1"/>
+          </p:cNvSpPr>
+          <p:nvPr>
+            <p:ph sz="half" idx="2"/>
+          </p:nvPr>
+        </p:nvSpPr>
+        <p:spPr>
+          <a:xfrm>
+            <a:off x="4508500" y="2336872"/>
+            <a:ext cx="5785681" cy="4114727"/>
+          </a:xfrm>
+        </p:spPr>
+        <p:txBody>
+          <a:bodyPr>
+            <a:normAutofit fontScale="92500" lnSpcReduction="10000"/>
+          </a:bodyPr>
           <a:lstStyle/>
           <a:p>
             <a:pPr marL="0" indent="0">
@@ -8106,25 +8607,537 @@
             </a:pPr>
             <a:r>
               <a:rPr lang="pl-PL" dirty="0"/>
-              <a:t/>
-            </a:r>
-            <a:br>
+              <a:t>Szum został stworzony w roku 1983 przez Perlina jako rezultat frustracji spowodowanej „maszyno-podobnym” wyglądem ówczesnej </a:t>
+            </a:r>
+            <a:r>
+              <a:rPr lang="pl-PL" dirty="0" smtClean="0"/>
+              <a:t>grafik </a:t>
+            </a:r>
+            <a:r>
               <a:rPr lang="pl-PL" dirty="0"/>
-            </a:br>
+              <a:t>komputerowej oraz w czasie jego prac nad filmem </a:t>
+            </a:r>
+            <a:r>
+              <a:rPr lang="pl-PL" dirty="0" smtClean="0"/>
+              <a:t>Tron. </a:t>
+            </a:r>
+            <a:r>
+              <a:rPr lang="pl-PL" dirty="0"/>
+              <a:t>Wyniki swojej pracy Perlin opublikował w 1985 </a:t>
+            </a:r>
+            <a:r>
+              <a:rPr lang="pl-PL" dirty="0" smtClean="0"/>
+              <a:t>roku. </a:t>
+            </a:r>
+            <a:r>
+              <a:rPr lang="pl-PL" dirty="0"/>
+              <a:t>W 1997 roku autor algorytmu otrzymał za swoją pracę Oscara w kategorii </a:t>
+            </a:r>
+            <a:r>
+              <a:rPr lang="pl-PL" dirty="0" smtClean="0"/>
+              <a:t>technicznej</a:t>
+            </a:r>
+            <a:r>
+              <a:rPr lang="pl-PL" baseline="30000" dirty="0" smtClean="0"/>
+              <a:t>.</a:t>
+            </a:r>
             <a:endParaRPr lang="pl-PL" dirty="0" smtClean="0"/>
+          </a:p>
+          <a:p>
+            <a:pPr marL="0" indent="0">
+              <a:buNone/>
+            </a:pPr>
+            <a:r>
+              <a:rPr lang="pl-PL" dirty="0" smtClean="0"/>
+              <a:t>Algorytm</a:t>
+            </a:r>
+            <a:r>
+              <a:rPr lang="pl-PL" dirty="0"/>
+              <a:t> generowania szumu </a:t>
+            </a:r>
+            <a:r>
+              <a:rPr lang="pl-PL" dirty="0" smtClean="0"/>
+              <a:t>gradientowego. Tworzenie tego szumu polega na utworzeniu siatki losowych gradientów, które są interpolowane w celu uzyskania wartości pomiędzy kratami. </a:t>
+            </a:r>
+            <a:endParaRPr lang="pl-PL" dirty="0"/>
           </a:p>
         </p:txBody>
       </p:sp>
     </p:spTree>
     <p:extLst>
       <p:ext uri="{BB962C8B-B14F-4D97-AF65-F5344CB8AC3E}">
-        <p14:creationId xmlns:p14="http://schemas.microsoft.com/office/powerpoint/2010/main" val="833921957"/>
+        <p14:creationId xmlns:p14="http://schemas.microsoft.com/office/powerpoint/2010/main" val="1904851423"/>
       </p:ext>
     </p:extLst>
   </p:cSld>
   <p:clrMapOvr>
     <a:masterClrMapping/>
   </p:clrMapOvr>
+  <p:timing>
+    <p:tnLst>
+      <p:par>
+        <p:cTn id="1" dur="indefinite" restart="never" nodeType="tmRoot"/>
+      </p:par>
+    </p:tnLst>
+  </p:timing>
+</p:sld>
+</file>
+
+<file path=ppt/slides/slide5.xml><?xml version="1.0" encoding="utf-8"?>
+<p:sld xmlns:a="http://schemas.openxmlformats.org/drawingml/2006/main" xmlns:r="http://schemas.openxmlformats.org/officeDocument/2006/relationships" xmlns:p="http://schemas.openxmlformats.org/presentationml/2006/main">
+  <p:cSld>
+    <p:spTree>
+      <p:nvGrpSpPr>
+        <p:cNvPr id="1" name=""/>
+        <p:cNvGrpSpPr/>
+        <p:nvPr/>
+      </p:nvGrpSpPr>
+      <p:grpSpPr>
+        <a:xfrm>
+          <a:off x="0" y="0"/>
+          <a:ext cx="0" cy="0"/>
+          <a:chOff x="0" y="0"/>
+          <a:chExt cx="0" cy="0"/>
+        </a:xfrm>
+      </p:grpSpPr>
+      <p:sp>
+        <p:nvSpPr>
+          <p:cNvPr id="2" name="Tytuł 1"/>
+          <p:cNvSpPr>
+            <a:spLocks noGrp="1"/>
+          </p:cNvSpPr>
+          <p:nvPr>
+            <p:ph type="title"/>
+          </p:nvPr>
+        </p:nvSpPr>
+        <p:spPr/>
+        <p:txBody>
+          <a:bodyPr/>
+          <a:lstStyle/>
+          <a:p>
+            <a:r>
+              <a:rPr lang="pl-PL" dirty="0"/>
+              <a:t>Algorytmy szukania ścieżki</a:t>
+            </a:r>
+          </a:p>
+        </p:txBody>
+      </p:sp>
+      <p:sp>
+        <p:nvSpPr>
+          <p:cNvPr id="3" name="Symbol zastępczy zawartości 2"/>
+          <p:cNvSpPr>
+            <a:spLocks noGrp="1"/>
+          </p:cNvSpPr>
+          <p:nvPr>
+            <p:ph idx="1"/>
+          </p:nvPr>
+        </p:nvSpPr>
+        <p:spPr>
+          <a:xfrm>
+            <a:off x="680321" y="2336872"/>
+            <a:ext cx="9613861" cy="4381427"/>
+          </a:xfrm>
+        </p:spPr>
+        <p:txBody>
+          <a:bodyPr>
+            <a:normAutofit/>
+          </a:bodyPr>
+          <a:lstStyle/>
+          <a:p>
+            <a:pPr marL="0" indent="0">
+              <a:buNone/>
+            </a:pPr>
+            <a:r>
+              <a:rPr lang="pl-PL" sz="2800" dirty="0"/>
+              <a:t>Do znalezienia najkrótszej ścieżki pomiędzy dwoma wierzchołkami zazwyczaj używane są algorytmy:</a:t>
+            </a:r>
+          </a:p>
+          <a:p>
+            <a:endParaRPr lang="pl-PL" dirty="0"/>
+          </a:p>
+          <a:p>
+            <a:r>
+              <a:rPr lang="pl-PL" dirty="0"/>
+              <a:t>Dijkstry (przy założeniu, że w grafie nie ma wag ujemnych) </a:t>
+            </a:r>
+            <a:r>
+              <a:rPr lang="pl-PL" dirty="0" smtClean="0"/>
+              <a:t>o pesymistycznej złożoności obliczeniowej O(</a:t>
+            </a:r>
+            <a:r>
+              <a:rPr lang="pl-PL" dirty="0" err="1" smtClean="0"/>
+              <a:t>Vlog</a:t>
+            </a:r>
+            <a:r>
+              <a:rPr lang="pl-PL" dirty="0" smtClean="0"/>
+              <a:t> V+E)</a:t>
+            </a:r>
+          </a:p>
+          <a:p>
+            <a:r>
+              <a:rPr lang="pl-PL" dirty="0" err="1" smtClean="0"/>
+              <a:t>Bellmana-Forda</a:t>
+            </a:r>
+            <a:r>
+              <a:rPr lang="pl-PL" dirty="0" smtClean="0"/>
+              <a:t> o pesymistycznej złożoności </a:t>
+            </a:r>
+            <a:br>
+              <a:rPr lang="pl-PL" dirty="0" smtClean="0"/>
+            </a:br>
+            <a:r>
+              <a:rPr lang="pl-PL" dirty="0" smtClean="0"/>
+              <a:t>obliczeniowej O(VE),</a:t>
+            </a:r>
+          </a:p>
+          <a:p>
+            <a:r>
+              <a:rPr lang="pl-PL" dirty="0" smtClean="0"/>
+              <a:t>A</a:t>
+            </a:r>
+            <a:r>
+              <a:rPr lang="pl-PL" dirty="0"/>
+              <a:t>*, używający heurystyki</a:t>
+            </a:r>
+            <a:r>
+              <a:rPr lang="pl-PL" dirty="0" smtClean="0"/>
+              <a:t>,</a:t>
+            </a:r>
+          </a:p>
+          <a:p>
+            <a:endParaRPr lang="pl-PL" dirty="0"/>
+          </a:p>
+          <a:p>
+            <a:pPr marL="0" indent="0">
+              <a:buNone/>
+            </a:pPr>
+            <a:r>
+              <a:rPr lang="pl-PL" dirty="0"/>
+              <a:t>gdzie V to liczba wierzchołków grafu, a E to liczba jego krawędzi.</a:t>
+            </a:r>
+            <a:endParaRPr lang="pl-PL" dirty="0"/>
+          </a:p>
+        </p:txBody>
+      </p:sp>
+    </p:spTree>
+    <p:extLst>
+      <p:ext uri="{BB962C8B-B14F-4D97-AF65-F5344CB8AC3E}">
+        <p14:creationId xmlns:p14="http://schemas.microsoft.com/office/powerpoint/2010/main" val="1083913898"/>
+      </p:ext>
+    </p:extLst>
+  </p:cSld>
+  <p:clrMapOvr>
+    <a:masterClrMapping/>
+  </p:clrMapOvr>
+</p:sld>
+</file>
+
+<file path=ppt/slides/slide6.xml><?xml version="1.0" encoding="utf-8"?>
+<p:sld xmlns:a="http://schemas.openxmlformats.org/drawingml/2006/main" xmlns:r="http://schemas.openxmlformats.org/officeDocument/2006/relationships" xmlns:p="http://schemas.openxmlformats.org/presentationml/2006/main">
+  <p:cSld>
+    <p:spTree>
+      <p:nvGrpSpPr>
+        <p:cNvPr id="1" name=""/>
+        <p:cNvGrpSpPr/>
+        <p:nvPr/>
+      </p:nvGrpSpPr>
+      <p:grpSpPr>
+        <a:xfrm>
+          <a:off x="0" y="0"/>
+          <a:ext cx="0" cy="0"/>
+          <a:chOff x="0" y="0"/>
+          <a:chExt cx="0" cy="0"/>
+        </a:xfrm>
+      </p:grpSpPr>
+      <p:sp>
+        <p:nvSpPr>
+          <p:cNvPr id="2" name="Tytuł 1"/>
+          <p:cNvSpPr>
+            <a:spLocks noGrp="1"/>
+          </p:cNvSpPr>
+          <p:nvPr>
+            <p:ph type="title"/>
+          </p:nvPr>
+        </p:nvSpPr>
+        <p:spPr/>
+        <p:txBody>
+          <a:bodyPr/>
+          <a:lstStyle/>
+          <a:p>
+            <a:r>
+              <a:rPr lang="pl-PL" dirty="0"/>
+              <a:t>Algorytmy szukania </a:t>
+            </a:r>
+            <a:r>
+              <a:rPr lang="pl-PL" dirty="0" smtClean="0"/>
+              <a:t>ścieżki – algorytm Dijkstry</a:t>
+            </a:r>
+            <a:endParaRPr lang="pl-PL" dirty="0"/>
+          </a:p>
+        </p:txBody>
+      </p:sp>
+      <p:pic>
+        <p:nvPicPr>
+          <p:cNvPr id="8" name="Symbol zastępczy zawartości 7"/>
+          <p:cNvPicPr>
+            <a:picLocks noGrp="1" noChangeAspect="1"/>
+          </p:cNvPicPr>
+          <p:nvPr>
+            <p:ph sz="half" idx="1"/>
+          </p:nvPr>
+        </p:nvPicPr>
+        <p:blipFill>
+          <a:blip r:embed="rId2">
+            <a:extLst>
+              <a:ext uri="{28A0092B-C50C-407E-A947-70E740481C1C}">
+                <a14:useLocalDpi xmlns:a14="http://schemas.microsoft.com/office/drawing/2010/main" val="0"/>
+              </a:ext>
+            </a:extLst>
+          </a:blip>
+          <a:stretch>
+            <a:fillRect/>
+          </a:stretch>
+        </p:blipFill>
+        <p:spPr>
+          <a:xfrm>
+            <a:off x="680321" y="2336872"/>
+            <a:ext cx="4588317" cy="4229027"/>
+          </a:xfrm>
+        </p:spPr>
+      </p:pic>
+      <p:sp>
+        <p:nvSpPr>
+          <p:cNvPr id="7" name="Symbol zastępczy zawartości 6"/>
+          <p:cNvSpPr>
+            <a:spLocks noGrp="1"/>
+          </p:cNvSpPr>
+          <p:nvPr>
+            <p:ph sz="half" idx="2"/>
+          </p:nvPr>
+        </p:nvSpPr>
+        <p:spPr>
+          <a:xfrm>
+            <a:off x="5594123" y="2336872"/>
+            <a:ext cx="4700058" cy="4368728"/>
+          </a:xfrm>
+        </p:spPr>
+        <p:txBody>
+          <a:bodyPr>
+            <a:normAutofit fontScale="77500" lnSpcReduction="20000"/>
+          </a:bodyPr>
+          <a:lstStyle/>
+          <a:p>
+            <a:r>
+              <a:rPr lang="pl-PL" dirty="0"/>
+              <a:t>Mając dany graf z wyróżnionym wierzchołkiem (źródłem) algorytm znajduje odległości od źródła do wszystkich pozostałych wierzchołków. Łatwo zmodyfikować go tak, aby szukał wyłącznie (najkrótszej) ścieżki do jednego ustalonego wierzchołka, po prostu przerywając działanie w momencie dojścia do wierzchołka docelowego, bądź transponując tablicę incydencji grafu</a:t>
+            </a:r>
+            <a:r>
+              <a:rPr lang="pl-PL" dirty="0" smtClean="0"/>
+              <a:t>.</a:t>
+            </a:r>
+            <a:endParaRPr lang="pl-PL" dirty="0"/>
+          </a:p>
+          <a:p>
+            <a:r>
+              <a:rPr lang="pl-PL" dirty="0"/>
+              <a:t>Algorytm Dijkstry znajduje w grafie wszystkie najkrótsze ścieżki pomiędzy wybranym wierzchołkiem a wszystkimi pozostałymi, przy okazji wyliczając również koszt przejścia każdej z tych </a:t>
+            </a:r>
+            <a:r>
+              <a:rPr lang="pl-PL" dirty="0" smtClean="0"/>
+              <a:t>ścieżek.</a:t>
+            </a:r>
+            <a:endParaRPr lang="pl-PL" dirty="0"/>
+          </a:p>
+          <a:p>
+            <a:r>
+              <a:rPr lang="pl-PL" dirty="0"/>
+              <a:t>Algorytm Dijkstry jest przykładem algorytmu </a:t>
+            </a:r>
+            <a:r>
+              <a:rPr lang="pl-PL" dirty="0" smtClean="0"/>
+              <a:t>zachłannego.</a:t>
+            </a:r>
+            <a:endParaRPr lang="pl-PL" dirty="0"/>
+          </a:p>
+        </p:txBody>
+      </p:sp>
+    </p:spTree>
+    <p:extLst>
+      <p:ext uri="{BB962C8B-B14F-4D97-AF65-F5344CB8AC3E}">
+        <p14:creationId xmlns:p14="http://schemas.microsoft.com/office/powerpoint/2010/main" val="1439500000"/>
+      </p:ext>
+    </p:extLst>
+  </p:cSld>
+  <p:clrMapOvr>
+    <a:masterClrMapping/>
+  </p:clrMapOvr>
+  <p:timing>
+    <p:tnLst>
+      <p:par>
+        <p:cTn id="1" dur="indefinite" restart="never" nodeType="tmRoot"/>
+      </p:par>
+    </p:tnLst>
+  </p:timing>
+</p:sld>
+</file>
+
+<file path=ppt/slides/slide7.xml><?xml version="1.0" encoding="utf-8"?>
+<p:sld xmlns:a="http://schemas.openxmlformats.org/drawingml/2006/main" xmlns:r="http://schemas.openxmlformats.org/officeDocument/2006/relationships" xmlns:p="http://schemas.openxmlformats.org/presentationml/2006/main">
+  <p:cSld>
+    <p:spTree>
+      <p:nvGrpSpPr>
+        <p:cNvPr id="1" name=""/>
+        <p:cNvGrpSpPr/>
+        <p:nvPr/>
+      </p:nvGrpSpPr>
+      <p:grpSpPr>
+        <a:xfrm>
+          <a:off x="0" y="0"/>
+          <a:ext cx="0" cy="0"/>
+          <a:chOff x="0" y="0"/>
+          <a:chExt cx="0" cy="0"/>
+        </a:xfrm>
+      </p:grpSpPr>
+      <p:sp>
+        <p:nvSpPr>
+          <p:cNvPr id="2" name="Tytuł 1"/>
+          <p:cNvSpPr>
+            <a:spLocks noGrp="1"/>
+          </p:cNvSpPr>
+          <p:nvPr>
+            <p:ph type="title"/>
+          </p:nvPr>
+        </p:nvSpPr>
+        <p:spPr/>
+        <p:txBody>
+          <a:bodyPr/>
+          <a:lstStyle/>
+          <a:p>
+            <a:r>
+              <a:rPr lang="pl-PL" dirty="0" smtClean="0"/>
+              <a:t>Algorytmy szukania </a:t>
+            </a:r>
+            <a:r>
+              <a:rPr lang="pl-PL" dirty="0" smtClean="0"/>
+              <a:t>ścieżki – A*</a:t>
+            </a:r>
+            <a:endParaRPr lang="pl-PL" dirty="0"/>
+          </a:p>
+        </p:txBody>
+      </p:sp>
+      <p:pic>
+        <p:nvPicPr>
+          <p:cNvPr id="6" name="Symbol zastępczy zawartości 5"/>
+          <p:cNvPicPr>
+            <a:picLocks noGrp="1" noChangeAspect="1"/>
+          </p:cNvPicPr>
+          <p:nvPr>
+            <p:ph sz="half" idx="1"/>
+          </p:nvPr>
+        </p:nvPicPr>
+        <p:blipFill>
+          <a:blip r:embed="rId3">
+            <a:extLst>
+              <a:ext uri="{28A0092B-C50C-407E-A947-70E740481C1C}">
+                <a14:useLocalDpi xmlns:a14="http://schemas.microsoft.com/office/drawing/2010/main" val="0"/>
+              </a:ext>
+            </a:extLst>
+          </a:blip>
+          <a:stretch>
+            <a:fillRect/>
+          </a:stretch>
+        </p:blipFill>
+        <p:spPr>
+          <a:xfrm>
+            <a:off x="225224" y="2336873"/>
+            <a:ext cx="5087371" cy="3599315"/>
+          </a:xfrm>
+        </p:spPr>
+      </p:pic>
+      <p:sp>
+        <p:nvSpPr>
+          <p:cNvPr id="5" name="Symbol zastępczy zawartości 4"/>
+          <p:cNvSpPr>
+            <a:spLocks noGrp="1"/>
+          </p:cNvSpPr>
+          <p:nvPr>
+            <p:ph sz="half" idx="2"/>
+          </p:nvPr>
+        </p:nvSpPr>
+        <p:spPr>
+          <a:xfrm>
+            <a:off x="5594123" y="2336873"/>
+            <a:ext cx="6388080" cy="3599316"/>
+          </a:xfrm>
+        </p:spPr>
+        <p:txBody>
+          <a:bodyPr>
+            <a:normAutofit lnSpcReduction="10000"/>
+          </a:bodyPr>
+          <a:lstStyle/>
+          <a:p>
+            <a:pPr marL="0" indent="0">
+              <a:buNone/>
+            </a:pPr>
+            <a:r>
+              <a:rPr lang="pl-PL" dirty="0" smtClean="0"/>
+              <a:t>Dzięki wykorzystaniu heurystyki, algorytm ten jest najszybszy w działaniu.</a:t>
+            </a:r>
+            <a:r>
+              <a:rPr lang="pl-PL" dirty="0"/>
+              <a:t> Metody używa się też często do znajdowania rozwiązań przybliżonych, na podstawie których później wylicza się ostateczny rezultat pełnym </a:t>
+            </a:r>
+            <a:r>
+              <a:rPr lang="pl-PL" dirty="0" smtClean="0"/>
+              <a:t>algorytmem</a:t>
+            </a:r>
+            <a:r>
+              <a:rPr lang="pl-PL" dirty="0"/>
+              <a:t>.</a:t>
+            </a:r>
+            <a:r>
+              <a:rPr lang="pl-PL" dirty="0" smtClean="0"/>
+              <a:t/>
+            </a:r>
+            <a:br>
+              <a:rPr lang="pl-PL" dirty="0" smtClean="0"/>
+            </a:br>
+            <a:r>
+              <a:rPr lang="pl-PL" dirty="0" smtClean="0"/>
+              <a:t/>
+            </a:r>
+            <a:br>
+              <a:rPr lang="pl-PL" dirty="0" smtClean="0"/>
+            </a:br>
+            <a:r>
+              <a:rPr lang="pl-PL" dirty="0" smtClean="0"/>
+              <a:t>Algorytm </a:t>
+            </a:r>
+            <a:r>
+              <a:rPr lang="pl-PL" dirty="0"/>
+              <a:t>A* jest kompletny – w każdym przypadku znajdzie optymalną drogę i zakończy działanie, jeśli taka droga istnieje. </a:t>
+            </a:r>
+            <a:endParaRPr lang="pl-PL" dirty="0"/>
+          </a:p>
+        </p:txBody>
+      </p:sp>
+    </p:spTree>
+    <p:extLst>
+      <p:ext uri="{BB962C8B-B14F-4D97-AF65-F5344CB8AC3E}">
+        <p14:creationId xmlns:p14="http://schemas.microsoft.com/office/powerpoint/2010/main" val="3667945494"/>
+      </p:ext>
+    </p:extLst>
+  </p:cSld>
+  <p:clrMapOvr>
+    <a:masterClrMapping/>
+  </p:clrMapOvr>
+  <p:timing>
+    <p:tnLst>
+      <p:par>
+        <p:cTn id="1" dur="indefinite" restart="never" nodeType="tmRoot"/>
+      </p:par>
+    </p:tnLst>
+  </p:timing>
 </p:sld>
 </file>
 
@@ -8380,4 +9393,265 @@
     </a:ext>
   </a:extLst>
 </a:theme>
+</file>
+
+<file path=ppt/theme/theme2.xml><?xml version="1.0" encoding="utf-8"?>
+<a:theme xmlns:a="http://schemas.openxmlformats.org/drawingml/2006/main" name="Motyw pakietu Office">
+  <a:themeElements>
+    <a:clrScheme name="Pakiet Office">
+      <a:dk1>
+        <a:sysClr val="windowText" lastClr="000000"/>
+      </a:dk1>
+      <a:lt1>
+        <a:sysClr val="window" lastClr="FFFFFF"/>
+      </a:lt1>
+      <a:dk2>
+        <a:srgbClr val="44546A"/>
+      </a:dk2>
+      <a:lt2>
+        <a:srgbClr val="E7E6E6"/>
+      </a:lt2>
+      <a:accent1>
+        <a:srgbClr val="5B9BD5"/>
+      </a:accent1>
+      <a:accent2>
+        <a:srgbClr val="ED7D31"/>
+      </a:accent2>
+      <a:accent3>
+        <a:srgbClr val="A5A5A5"/>
+      </a:accent3>
+      <a:accent4>
+        <a:srgbClr val="FFC000"/>
+      </a:accent4>
+      <a:accent5>
+        <a:srgbClr val="4472C4"/>
+      </a:accent5>
+      <a:accent6>
+        <a:srgbClr val="70AD47"/>
+      </a:accent6>
+      <a:hlink>
+        <a:srgbClr val="0563C1"/>
+      </a:hlink>
+      <a:folHlink>
+        <a:srgbClr val="954F72"/>
+      </a:folHlink>
+    </a:clrScheme>
+    <a:fontScheme name="Pakiet Office">
+      <a:majorFont>
+        <a:latin typeface="Calibri Light" panose="020F0302020204030204"/>
+        <a:ea typeface=""/>
+        <a:cs typeface=""/>
+        <a:font script="Jpan" typeface="游ゴシック Light"/>
+        <a:font script="Hang" typeface="맑은 고딕"/>
+        <a:font script="Hans" typeface="等线 Light"/>
+        <a:font script="Hant" typeface="新細明體"/>
+        <a:font script="Arab" typeface="Times New Roman"/>
+        <a:font script="Hebr" typeface="Times New Roman"/>
+        <a:font script="Thai" typeface="Angsana New"/>
+        <a:font script="Ethi" typeface="Nyala"/>
+        <a:font script="Beng" typeface="Vrinda"/>
+        <a:font script="Gujr" typeface="Shruti"/>
+        <a:font script="Khmr" typeface="MoolBoran"/>
+        <a:font script="Knda" typeface="Tunga"/>
+        <a:font script="Guru" typeface="Raavi"/>
+        <a:font script="Cans" typeface="Euphemia"/>
+        <a:font script="Cher" typeface="Plantagenet Cherokee"/>
+        <a:font script="Yiii" typeface="Microsoft Yi Baiti"/>
+        <a:font script="Tibt" typeface="Microsoft Himalaya"/>
+        <a:font script="Thaa" typeface="MV Boli"/>
+        <a:font script="Deva" typeface="Mangal"/>
+        <a:font script="Telu" typeface="Gautami"/>
+        <a:font script="Taml" typeface="Latha"/>
+        <a:font script="Syrc" typeface="Estrangelo Edessa"/>
+        <a:font script="Orya" typeface="Kalinga"/>
+        <a:font script="Mlym" typeface="Kartika"/>
+        <a:font script="Laoo" typeface="DokChampa"/>
+        <a:font script="Sinh" typeface="Iskoola Pota"/>
+        <a:font script="Mong" typeface="Mongolian Baiti"/>
+        <a:font script="Viet" typeface="Times New Roman"/>
+        <a:font script="Uigh" typeface="Microsoft Uighur"/>
+        <a:font script="Geor" typeface="Sylfaen"/>
+      </a:majorFont>
+      <a:minorFont>
+        <a:latin typeface="Calibri" panose="020F0502020204030204"/>
+        <a:ea typeface=""/>
+        <a:cs typeface=""/>
+        <a:font script="Jpan" typeface="游ゴシック"/>
+        <a:font script="Hang" typeface="맑은 고딕"/>
+        <a:font script="Hans" typeface="等线"/>
+        <a:font script="Hant" typeface="新細明體"/>
+        <a:font script="Arab" typeface="Arial"/>
+        <a:font script="Hebr" typeface="Arial"/>
+        <a:font script="Thai" typeface="Cordia New"/>
+        <a:font script="Ethi" typeface="Nyala"/>
+        <a:font script="Beng" typeface="Vrinda"/>
+        <a:font script="Gujr" typeface="Shruti"/>
+        <a:font script="Khmr" typeface="DaunPenh"/>
+        <a:font script="Knda" typeface="Tunga"/>
+        <a:font script="Guru" typeface="Raavi"/>
+        <a:font script="Cans" typeface="Euphemia"/>
+        <a:font script="Cher" typeface="Plantagenet Cherokee"/>
+        <a:font script="Yiii" typeface="Microsoft Yi Baiti"/>
+        <a:font script="Tibt" typeface="Microsoft Himalaya"/>
+        <a:font script="Thaa" typeface="MV Boli"/>
+        <a:font script="Deva" typeface="Mangal"/>
+        <a:font script="Telu" typeface="Gautami"/>
+        <a:font script="Taml" typeface="Latha"/>
+        <a:font script="Syrc" typeface="Estrangelo Edessa"/>
+        <a:font script="Orya" typeface="Kalinga"/>
+        <a:font script="Mlym" typeface="Kartika"/>
+        <a:font script="Laoo" typeface="DokChampa"/>
+        <a:font script="Sinh" typeface="Iskoola Pota"/>
+        <a:font script="Mong" typeface="Mongolian Baiti"/>
+        <a:font script="Viet" typeface="Arial"/>
+        <a:font script="Uigh" typeface="Microsoft Uighur"/>
+        <a:font script="Geor" typeface="Sylfaen"/>
+      </a:minorFont>
+    </a:fontScheme>
+    <a:fmtScheme name="Pakiet Office">
+      <a:fillStyleLst>
+        <a:solidFill>
+          <a:schemeClr val="phClr"/>
+        </a:solidFill>
+        <a:gradFill rotWithShape="1">
+          <a:gsLst>
+            <a:gs pos="0">
+              <a:schemeClr val="phClr">
+                <a:lumMod val="110000"/>
+                <a:satMod val="105000"/>
+                <a:tint val="67000"/>
+              </a:schemeClr>
+            </a:gs>
+            <a:gs pos="50000">
+              <a:schemeClr val="phClr">
+                <a:lumMod val="105000"/>
+                <a:satMod val="103000"/>
+                <a:tint val="73000"/>
+              </a:schemeClr>
+            </a:gs>
+            <a:gs pos="100000">
+              <a:schemeClr val="phClr">
+                <a:lumMod val="105000"/>
+                <a:satMod val="109000"/>
+                <a:tint val="81000"/>
+              </a:schemeClr>
+            </a:gs>
+          </a:gsLst>
+          <a:lin ang="5400000" scaled="0"/>
+        </a:gradFill>
+        <a:gradFill rotWithShape="1">
+          <a:gsLst>
+            <a:gs pos="0">
+              <a:schemeClr val="phClr">
+                <a:satMod val="103000"/>
+                <a:lumMod val="102000"/>
+                <a:tint val="94000"/>
+              </a:schemeClr>
+            </a:gs>
+            <a:gs pos="50000">
+              <a:schemeClr val="phClr">
+                <a:satMod val="110000"/>
+                <a:lumMod val="100000"/>
+                <a:shade val="100000"/>
+              </a:schemeClr>
+            </a:gs>
+            <a:gs pos="100000">
+              <a:schemeClr val="phClr">
+                <a:lumMod val="99000"/>
+                <a:satMod val="120000"/>
+                <a:shade val="78000"/>
+              </a:schemeClr>
+            </a:gs>
+          </a:gsLst>
+          <a:lin ang="5400000" scaled="0"/>
+        </a:gradFill>
+      </a:fillStyleLst>
+      <a:lnStyleLst>
+        <a:ln w="6350" cap="flat" cmpd="sng" algn="ctr">
+          <a:solidFill>
+            <a:schemeClr val="phClr"/>
+          </a:solidFill>
+          <a:prstDash val="solid"/>
+          <a:miter lim="800000"/>
+        </a:ln>
+        <a:ln w="12700" cap="flat" cmpd="sng" algn="ctr">
+          <a:solidFill>
+            <a:schemeClr val="phClr"/>
+          </a:solidFill>
+          <a:prstDash val="solid"/>
+          <a:miter lim="800000"/>
+        </a:ln>
+        <a:ln w="19050" cap="flat" cmpd="sng" algn="ctr">
+          <a:solidFill>
+            <a:schemeClr val="phClr"/>
+          </a:solidFill>
+          <a:prstDash val="solid"/>
+          <a:miter lim="800000"/>
+        </a:ln>
+      </a:lnStyleLst>
+      <a:effectStyleLst>
+        <a:effectStyle>
+          <a:effectLst/>
+        </a:effectStyle>
+        <a:effectStyle>
+          <a:effectLst/>
+        </a:effectStyle>
+        <a:effectStyle>
+          <a:effectLst>
+            <a:outerShdw blurRad="57150" dist="19050" dir="5400000" algn="ctr" rotWithShape="0">
+              <a:srgbClr val="000000">
+                <a:alpha val="63000"/>
+              </a:srgbClr>
+            </a:outerShdw>
+          </a:effectLst>
+        </a:effectStyle>
+      </a:effectStyleLst>
+      <a:bgFillStyleLst>
+        <a:solidFill>
+          <a:schemeClr val="phClr"/>
+        </a:solidFill>
+        <a:solidFill>
+          <a:schemeClr val="phClr">
+            <a:tint val="95000"/>
+            <a:satMod val="170000"/>
+          </a:schemeClr>
+        </a:solidFill>
+        <a:gradFill rotWithShape="1">
+          <a:gsLst>
+            <a:gs pos="0">
+              <a:schemeClr val="phClr">
+                <a:tint val="93000"/>
+                <a:satMod val="150000"/>
+                <a:shade val="98000"/>
+                <a:lumMod val="102000"/>
+              </a:schemeClr>
+            </a:gs>
+            <a:gs pos="50000">
+              <a:schemeClr val="phClr">
+                <a:tint val="98000"/>
+                <a:satMod val="130000"/>
+                <a:shade val="90000"/>
+                <a:lumMod val="103000"/>
+              </a:schemeClr>
+            </a:gs>
+            <a:gs pos="100000">
+              <a:schemeClr val="phClr">
+                <a:shade val="63000"/>
+                <a:satMod val="120000"/>
+              </a:schemeClr>
+            </a:gs>
+          </a:gsLst>
+          <a:lin ang="5400000" scaled="0"/>
+        </a:gradFill>
+      </a:bgFillStyleLst>
+    </a:fmtScheme>
+  </a:themeElements>
+  <a:objectDefaults/>
+  <a:extraClrSchemeLst/>
+  <a:extLst>
+    <a:ext uri="{05A4C25C-085E-4340-85A3-A5531E510DB2}">
+      <thm15:themeFamily xmlns:thm15="http://schemas.microsoft.com/office/thememl/2012/main" name="Office Theme" id="{62F939B6-93AF-4DB8-9C6B-D6C7DFDC589F}" vid="{4A3C46E8-61CC-4603-A589-7422A47A8E4A}"/>
+    </a:ext>
+  </a:extLst>
+</a:theme>
 </file>
</xml_diff>